<commit_message>
Team K modified weekly progress
</commit_message>
<xml_diff>
--- a/Team K/Weekly_progress/2nd/weekly_progress_2_v1.pptx
+++ b/Team K/Weekly_progress/2nd/weekly_progress_2_v1.pptx
@@ -29,28 +29,30 @@
   <p:notesSz cx="6858000" cy="9144000"/>
   <p:embeddedFontLst>
     <p:embeddedFont>
-      <p:font typeface="Cascadia Code" panose="020B0609020000020004" pitchFamily="49" charset="0"/>
+      <p:font typeface="나눔스퀘어_ac" panose="020B0600000101010101" pitchFamily="34" charset="-127"/>
       <p:regular r:id="rId19"/>
       <p:bold r:id="rId20"/>
       <p:italic r:id="rId21"/>
       <p:boldItalic r:id="rId22"/>
     </p:embeddedFont>
     <p:embeddedFont>
-      <p:font typeface="나눔스퀘어_ac" panose="020B0600000101010101" pitchFamily="50" charset="-127"/>
+      <p:font typeface="나눔스퀘어_ac Bold" panose="020B0600000101010101" pitchFamily="34" charset="-127"/>
       <p:regular r:id="rId23"/>
+      <p:bold r:id="rId24"/>
+      <p:italic r:id="rId25"/>
+      <p:boldItalic r:id="rId26"/>
     </p:embeddedFont>
     <p:embeddedFont>
-      <p:font typeface="나눔스퀘어_ac ExtraBold" panose="020B0600000101010101" pitchFamily="50" charset="-127"/>
-      <p:bold r:id="rId24"/>
+      <p:font typeface="나눔스퀘어_ac ExtraBold" panose="020B0600000101010101" pitchFamily="34" charset="-127"/>
+      <p:regular r:id="rId27"/>
+      <p:bold r:id="rId28"/>
+      <p:italic r:id="rId29"/>
+      <p:boldItalic r:id="rId30"/>
     </p:embeddedFont>
     <p:embeddedFont>
-      <p:font typeface="맑은 고딕" panose="020B0503020000020004" pitchFamily="50" charset="-127"/>
-      <p:regular r:id="rId25"/>
-      <p:bold r:id="rId26"/>
-    </p:embeddedFont>
-    <p:embeddedFont>
-      <p:font typeface="나눔스퀘어_ac Bold" panose="020B0600000101010101" pitchFamily="50" charset="-127"/>
-      <p:bold r:id="rId27"/>
+      <p:font typeface="Malgun Gothic" panose="020B0503020000020004" pitchFamily="34" charset="-127"/>
+      <p:regular r:id="rId31"/>
+      <p:bold r:id="rId32"/>
     </p:embeddedFont>
   </p:embeddedFontLst>
   <p:defaultTextStyle>
@@ -238,7 +240,7 @@
           <a:p>
             <a:fld id="{7EA5B3EF-094D-4D17-9036-A1748B2013AE}" type="datetimeFigureOut">
               <a:rPr lang="ko-KR" altLang="en-US" smtClean="0"/>
-              <a:t>2024-11-15</a:t>
+              <a:t>2024. 11. 14.</a:t>
             </a:fld>
             <a:endParaRPr lang="ko-KR" altLang="en-US"/>
           </a:p>
@@ -302,38 +304,37 @@
           <a:p>
             <a:pPr lvl="0"/>
             <a:r>
-              <a:rPr lang="ko-KR" altLang="en-US" smtClean="0"/>
+              <a:rPr lang="ko-KR" altLang="en-US"/>
               <a:t>마스터 텍스트 스타일을 편집합니다</a:t>
             </a:r>
           </a:p>
           <a:p>
             <a:pPr lvl="1"/>
             <a:r>
-              <a:rPr lang="ko-KR" altLang="en-US" smtClean="0"/>
+              <a:rPr lang="ko-KR" altLang="en-US"/>
               <a:t>둘째 수준</a:t>
             </a:r>
           </a:p>
           <a:p>
             <a:pPr lvl="2"/>
             <a:r>
-              <a:rPr lang="ko-KR" altLang="en-US" smtClean="0"/>
+              <a:rPr lang="ko-KR" altLang="en-US"/>
               <a:t>셋째 수준</a:t>
             </a:r>
           </a:p>
           <a:p>
             <a:pPr lvl="3"/>
             <a:r>
-              <a:rPr lang="ko-KR" altLang="en-US" smtClean="0"/>
+              <a:rPr lang="ko-KR" altLang="en-US"/>
               <a:t>넷째 수준</a:t>
             </a:r>
           </a:p>
           <a:p>
             <a:pPr lvl="4"/>
             <a:r>
-              <a:rPr lang="ko-KR" altLang="en-US" smtClean="0"/>
+              <a:rPr lang="ko-KR" altLang="en-US"/>
               <a:t>다섯째 수준</a:t>
             </a:r>
-            <a:endParaRPr lang="ko-KR" altLang="en-US"/>
           </a:p>
         </p:txBody>
       </p:sp>
@@ -568,7 +569,7 @@
               <a:defRPr/>
             </a:pPr>
             <a:r>
-              <a:rPr lang="en-US" altLang="ko-KR" smtClean="0"/>
+              <a:rPr lang="en-US" altLang="ko-KR"/>
               <a:t>Backend functionalities are almost done, and we’re working on exception handling like constraints for user registration, login, and token expiration.</a:t>
             </a:r>
           </a:p>
@@ -675,7 +676,7 @@
               <a:defRPr/>
             </a:pPr>
             <a:r>
-              <a:rPr lang="en-US" altLang="ko-KR" smtClean="0"/>
+              <a:rPr lang="en-US" altLang="ko-KR"/>
               <a:t>And, Backend started testing each api through testing framework pytest.</a:t>
             </a:r>
           </a:p>
@@ -782,7 +783,7 @@
               <a:defRPr/>
             </a:pPr>
             <a:r>
-              <a:rPr lang="en-US" altLang="ko-KR" smtClean="0"/>
+              <a:rPr lang="en-US" altLang="ko-KR"/>
               <a:t>But since we’re using email to login and don’t want people to access through random email, so we’re also trying to implement email confirmation by using fastapi-mail library. The user will be able to access after typing exact code that’s in the mail</a:t>
             </a:r>
           </a:p>
@@ -872,11 +873,11 @@
           <a:lstStyle/>
           <a:p>
             <a:r>
-              <a:rPr lang="en-US" altLang="ko-KR" smtClean="0"/>
+              <a:rPr lang="en-US" altLang="ko-KR"/>
               <a:t>Ragas is a library that provides tools to evaluate LLM based applications. To test</a:t>
             </a:r>
             <a:r>
-              <a:rPr lang="en-US" altLang="ko-KR" baseline="0" smtClean="0"/>
+              <a:rPr lang="en-US" altLang="ko-KR" baseline="0"/>
               <a:t> chatbot using RAGAS, we need some sample datasets. There are two kinds of datasets : synthetic test dataset generated automatically by langchain and test dataset generated by human in hand! In this project, we’re trying both kinds of test datasets to evaluate models more objectively. By using these datasets, we can evaluate our model with various metrics.</a:t>
             </a:r>
             <a:endParaRPr lang="ko-KR" altLang="en-US"/>
@@ -964,11 +965,11 @@
           <a:lstStyle/>
           <a:p>
             <a:r>
-              <a:rPr lang="en-US" altLang="ko-KR" smtClean="0"/>
+              <a:rPr lang="en-US" altLang="ko-KR"/>
               <a:t>There are four</a:t>
             </a:r>
             <a:r>
-              <a:rPr lang="en-US" altLang="ko-KR" baseline="0" smtClean="0"/>
+              <a:rPr lang="en-US" altLang="ko-KR" baseline="0"/>
               <a:t> main metrics that we can evaluate our model in RAGAS. ~ ~ ~ ~. We will conduct the evaluation by tuning our model and changing several parameters.</a:t>
             </a:r>
             <a:endParaRPr lang="ko-KR" altLang="en-US"/>
@@ -1053,10 +1054,9 @@
           </a:lstStyle>
           <a:p>
             <a:r>
-              <a:rPr lang="ko-KR" altLang="en-US" smtClean="0"/>
+              <a:rPr lang="ko-KR" altLang="en-US"/>
               <a:t>마스터 제목 스타일 편집</a:t>
             </a:r>
-            <a:endParaRPr lang="ko-KR" altLang="en-US"/>
           </a:p>
         </p:txBody>
       </p:sp>
@@ -1118,10 +1118,9 @@
           </a:lstStyle>
           <a:p>
             <a:r>
-              <a:rPr lang="ko-KR" altLang="en-US" smtClean="0"/>
+              <a:rPr lang="ko-KR" altLang="en-US"/>
               <a:t>마스터 부제목 스타일 편집</a:t>
             </a:r>
-            <a:endParaRPr lang="ko-KR" altLang="en-US"/>
           </a:p>
         </p:txBody>
       </p:sp>
@@ -1142,7 +1141,7 @@
           <a:p>
             <a:fld id="{9F6F6247-C8E0-4D66-A20E-9FC1B7784E7A}" type="datetimeFigureOut">
               <a:rPr lang="ko-KR" altLang="en-US" smtClean="0"/>
-              <a:t>2024-11-15</a:t>
+              <a:t>2024. 11. 14.</a:t>
             </a:fld>
             <a:endParaRPr lang="ko-KR" altLang="en-US"/>
           </a:p>
@@ -1236,10 +1235,9 @@
           <a:lstStyle/>
           <a:p>
             <a:r>
-              <a:rPr lang="ko-KR" altLang="en-US" smtClean="0"/>
+              <a:rPr lang="ko-KR" altLang="en-US"/>
               <a:t>마스터 제목 스타일 편집</a:t>
             </a:r>
-            <a:endParaRPr lang="ko-KR" altLang="en-US"/>
           </a:p>
         </p:txBody>
       </p:sp>
@@ -1260,38 +1258,37 @@
           <a:p>
             <a:pPr lvl="0"/>
             <a:r>
-              <a:rPr lang="ko-KR" altLang="en-US" smtClean="0"/>
+              <a:rPr lang="ko-KR" altLang="en-US"/>
               <a:t>마스터 텍스트 스타일을 편집합니다</a:t>
             </a:r>
           </a:p>
           <a:p>
             <a:pPr lvl="1"/>
             <a:r>
-              <a:rPr lang="ko-KR" altLang="en-US" smtClean="0"/>
+              <a:rPr lang="ko-KR" altLang="en-US"/>
               <a:t>둘째 수준</a:t>
             </a:r>
           </a:p>
           <a:p>
             <a:pPr lvl="2"/>
             <a:r>
-              <a:rPr lang="ko-KR" altLang="en-US" smtClean="0"/>
+              <a:rPr lang="ko-KR" altLang="en-US"/>
               <a:t>셋째 수준</a:t>
             </a:r>
           </a:p>
           <a:p>
             <a:pPr lvl="3"/>
             <a:r>
-              <a:rPr lang="ko-KR" altLang="en-US" smtClean="0"/>
+              <a:rPr lang="ko-KR" altLang="en-US"/>
               <a:t>넷째 수준</a:t>
             </a:r>
           </a:p>
           <a:p>
             <a:pPr lvl="4"/>
             <a:r>
-              <a:rPr lang="ko-KR" altLang="en-US" smtClean="0"/>
+              <a:rPr lang="ko-KR" altLang="en-US"/>
               <a:t>다섯째 수준</a:t>
             </a:r>
-            <a:endParaRPr lang="ko-KR" altLang="en-US"/>
           </a:p>
         </p:txBody>
       </p:sp>
@@ -1312,7 +1309,7 @@
           <a:p>
             <a:fld id="{9F6F6247-C8E0-4D66-A20E-9FC1B7784E7A}" type="datetimeFigureOut">
               <a:rPr lang="ko-KR" altLang="en-US" smtClean="0"/>
-              <a:t>2024-11-15</a:t>
+              <a:t>2024. 11. 14.</a:t>
             </a:fld>
             <a:endParaRPr lang="ko-KR" altLang="en-US"/>
           </a:p>
@@ -1411,10 +1408,9 @@
           <a:lstStyle/>
           <a:p>
             <a:r>
-              <a:rPr lang="ko-KR" altLang="en-US" smtClean="0"/>
+              <a:rPr lang="ko-KR" altLang="en-US"/>
               <a:t>마스터 제목 스타일 편집</a:t>
             </a:r>
-            <a:endParaRPr lang="ko-KR" altLang="en-US"/>
           </a:p>
         </p:txBody>
       </p:sp>
@@ -1440,38 +1436,37 @@
           <a:p>
             <a:pPr lvl="0"/>
             <a:r>
-              <a:rPr lang="ko-KR" altLang="en-US" smtClean="0"/>
+              <a:rPr lang="ko-KR" altLang="en-US"/>
               <a:t>마스터 텍스트 스타일을 편집합니다</a:t>
             </a:r>
           </a:p>
           <a:p>
             <a:pPr lvl="1"/>
             <a:r>
-              <a:rPr lang="ko-KR" altLang="en-US" smtClean="0"/>
+              <a:rPr lang="ko-KR" altLang="en-US"/>
               <a:t>둘째 수준</a:t>
             </a:r>
           </a:p>
           <a:p>
             <a:pPr lvl="2"/>
             <a:r>
-              <a:rPr lang="ko-KR" altLang="en-US" smtClean="0"/>
+              <a:rPr lang="ko-KR" altLang="en-US"/>
               <a:t>셋째 수준</a:t>
             </a:r>
           </a:p>
           <a:p>
             <a:pPr lvl="3"/>
             <a:r>
-              <a:rPr lang="ko-KR" altLang="en-US" smtClean="0"/>
+              <a:rPr lang="ko-KR" altLang="en-US"/>
               <a:t>넷째 수준</a:t>
             </a:r>
           </a:p>
           <a:p>
             <a:pPr lvl="4"/>
             <a:r>
-              <a:rPr lang="ko-KR" altLang="en-US" smtClean="0"/>
+              <a:rPr lang="ko-KR" altLang="en-US"/>
               <a:t>다섯째 수준</a:t>
             </a:r>
-            <a:endParaRPr lang="ko-KR" altLang="en-US"/>
           </a:p>
         </p:txBody>
       </p:sp>
@@ -1492,7 +1487,7 @@
           <a:p>
             <a:fld id="{9F6F6247-C8E0-4D66-A20E-9FC1B7784E7A}" type="datetimeFigureOut">
               <a:rPr lang="ko-KR" altLang="en-US" smtClean="0"/>
-              <a:t>2024-11-15</a:t>
+              <a:t>2024. 11. 14.</a:t>
             </a:fld>
             <a:endParaRPr lang="ko-KR" altLang="en-US"/>
           </a:p>
@@ -1586,10 +1581,9 @@
           <a:lstStyle/>
           <a:p>
             <a:r>
-              <a:rPr lang="ko-KR" altLang="en-US" smtClean="0"/>
+              <a:rPr lang="ko-KR" altLang="en-US"/>
               <a:t>마스터 제목 스타일 편집</a:t>
             </a:r>
-            <a:endParaRPr lang="ko-KR" altLang="en-US"/>
           </a:p>
         </p:txBody>
       </p:sp>
@@ -1610,38 +1604,37 @@
           <a:p>
             <a:pPr lvl="0"/>
             <a:r>
-              <a:rPr lang="ko-KR" altLang="en-US" smtClean="0"/>
+              <a:rPr lang="ko-KR" altLang="en-US"/>
               <a:t>마스터 텍스트 스타일을 편집합니다</a:t>
             </a:r>
           </a:p>
           <a:p>
             <a:pPr lvl="1"/>
             <a:r>
-              <a:rPr lang="ko-KR" altLang="en-US" smtClean="0"/>
+              <a:rPr lang="ko-KR" altLang="en-US"/>
               <a:t>둘째 수준</a:t>
             </a:r>
           </a:p>
           <a:p>
             <a:pPr lvl="2"/>
             <a:r>
-              <a:rPr lang="ko-KR" altLang="en-US" smtClean="0"/>
+              <a:rPr lang="ko-KR" altLang="en-US"/>
               <a:t>셋째 수준</a:t>
             </a:r>
           </a:p>
           <a:p>
             <a:pPr lvl="3"/>
             <a:r>
-              <a:rPr lang="ko-KR" altLang="en-US" smtClean="0"/>
+              <a:rPr lang="ko-KR" altLang="en-US"/>
               <a:t>넷째 수준</a:t>
             </a:r>
           </a:p>
           <a:p>
             <a:pPr lvl="4"/>
             <a:r>
-              <a:rPr lang="ko-KR" altLang="en-US" smtClean="0"/>
+              <a:rPr lang="ko-KR" altLang="en-US"/>
               <a:t>다섯째 수준</a:t>
             </a:r>
-            <a:endParaRPr lang="ko-KR" altLang="en-US"/>
           </a:p>
         </p:txBody>
       </p:sp>
@@ -1662,7 +1655,7 @@
           <a:p>
             <a:fld id="{9F6F6247-C8E0-4D66-A20E-9FC1B7784E7A}" type="datetimeFigureOut">
               <a:rPr lang="ko-KR" altLang="en-US" smtClean="0"/>
-              <a:t>2024-11-15</a:t>
+              <a:t>2024. 11. 14.</a:t>
             </a:fld>
             <a:endParaRPr lang="ko-KR" altLang="en-US"/>
           </a:p>
@@ -1765,10 +1758,9 @@
           </a:lstStyle>
           <a:p>
             <a:r>
-              <a:rPr lang="ko-KR" altLang="en-US" smtClean="0"/>
+              <a:rPr lang="ko-KR" altLang="en-US"/>
               <a:t>마스터 제목 스타일 편집</a:t>
             </a:r>
-            <a:endParaRPr lang="ko-KR" altLang="en-US"/>
           </a:p>
         </p:txBody>
       </p:sp>
@@ -1885,7 +1877,7 @@
           <a:p>
             <a:pPr lvl="0"/>
             <a:r>
-              <a:rPr lang="ko-KR" altLang="en-US" smtClean="0"/>
+              <a:rPr lang="ko-KR" altLang="en-US"/>
               <a:t>마스터 텍스트 스타일을 편집합니다</a:t>
             </a:r>
           </a:p>
@@ -1908,7 +1900,7 @@
           <a:p>
             <a:fld id="{9F6F6247-C8E0-4D66-A20E-9FC1B7784E7A}" type="datetimeFigureOut">
               <a:rPr lang="ko-KR" altLang="en-US" smtClean="0"/>
-              <a:t>2024-11-15</a:t>
+              <a:t>2024. 11. 14.</a:t>
             </a:fld>
             <a:endParaRPr lang="ko-KR" altLang="en-US"/>
           </a:p>
@@ -2002,10 +1994,9 @@
           <a:lstStyle/>
           <a:p>
             <a:r>
-              <a:rPr lang="ko-KR" altLang="en-US" smtClean="0"/>
+              <a:rPr lang="ko-KR" altLang="en-US"/>
               <a:t>마스터 제목 스타일 편집</a:t>
             </a:r>
-            <a:endParaRPr lang="ko-KR" altLang="en-US"/>
           </a:p>
         </p:txBody>
       </p:sp>
@@ -2031,38 +2022,37 @@
           <a:p>
             <a:pPr lvl="0"/>
             <a:r>
-              <a:rPr lang="ko-KR" altLang="en-US" smtClean="0"/>
+              <a:rPr lang="ko-KR" altLang="en-US"/>
               <a:t>마스터 텍스트 스타일을 편집합니다</a:t>
             </a:r>
           </a:p>
           <a:p>
             <a:pPr lvl="1"/>
             <a:r>
-              <a:rPr lang="ko-KR" altLang="en-US" smtClean="0"/>
+              <a:rPr lang="ko-KR" altLang="en-US"/>
               <a:t>둘째 수준</a:t>
             </a:r>
           </a:p>
           <a:p>
             <a:pPr lvl="2"/>
             <a:r>
-              <a:rPr lang="ko-KR" altLang="en-US" smtClean="0"/>
+              <a:rPr lang="ko-KR" altLang="en-US"/>
               <a:t>셋째 수준</a:t>
             </a:r>
           </a:p>
           <a:p>
             <a:pPr lvl="3"/>
             <a:r>
-              <a:rPr lang="ko-KR" altLang="en-US" smtClean="0"/>
+              <a:rPr lang="ko-KR" altLang="en-US"/>
               <a:t>넷째 수준</a:t>
             </a:r>
           </a:p>
           <a:p>
             <a:pPr lvl="4"/>
             <a:r>
-              <a:rPr lang="ko-KR" altLang="en-US" smtClean="0"/>
+              <a:rPr lang="ko-KR" altLang="en-US"/>
               <a:t>다섯째 수준</a:t>
             </a:r>
-            <a:endParaRPr lang="ko-KR" altLang="en-US"/>
           </a:p>
         </p:txBody>
       </p:sp>
@@ -2088,38 +2078,37 @@
           <a:p>
             <a:pPr lvl="0"/>
             <a:r>
-              <a:rPr lang="ko-KR" altLang="en-US" smtClean="0"/>
+              <a:rPr lang="ko-KR" altLang="en-US"/>
               <a:t>마스터 텍스트 스타일을 편집합니다</a:t>
             </a:r>
           </a:p>
           <a:p>
             <a:pPr lvl="1"/>
             <a:r>
-              <a:rPr lang="ko-KR" altLang="en-US" smtClean="0"/>
+              <a:rPr lang="ko-KR" altLang="en-US"/>
               <a:t>둘째 수준</a:t>
             </a:r>
           </a:p>
           <a:p>
             <a:pPr lvl="2"/>
             <a:r>
-              <a:rPr lang="ko-KR" altLang="en-US" smtClean="0"/>
+              <a:rPr lang="ko-KR" altLang="en-US"/>
               <a:t>셋째 수준</a:t>
             </a:r>
           </a:p>
           <a:p>
             <a:pPr lvl="3"/>
             <a:r>
-              <a:rPr lang="ko-KR" altLang="en-US" smtClean="0"/>
+              <a:rPr lang="ko-KR" altLang="en-US"/>
               <a:t>넷째 수준</a:t>
             </a:r>
           </a:p>
           <a:p>
             <a:pPr lvl="4"/>
             <a:r>
-              <a:rPr lang="ko-KR" altLang="en-US" smtClean="0"/>
+              <a:rPr lang="ko-KR" altLang="en-US"/>
               <a:t>다섯째 수준</a:t>
             </a:r>
-            <a:endParaRPr lang="ko-KR" altLang="en-US"/>
           </a:p>
         </p:txBody>
       </p:sp>
@@ -2140,7 +2129,7 @@
           <a:p>
             <a:fld id="{9F6F6247-C8E0-4D66-A20E-9FC1B7784E7A}" type="datetimeFigureOut">
               <a:rPr lang="ko-KR" altLang="en-US" smtClean="0"/>
-              <a:t>2024-11-15</a:t>
+              <a:t>2024. 11. 14.</a:t>
             </a:fld>
             <a:endParaRPr lang="ko-KR" altLang="en-US"/>
           </a:p>
@@ -2239,10 +2228,9 @@
           <a:lstStyle/>
           <a:p>
             <a:r>
-              <a:rPr lang="ko-KR" altLang="en-US" smtClean="0"/>
+              <a:rPr lang="ko-KR" altLang="en-US"/>
               <a:t>마스터 제목 스타일 편집</a:t>
             </a:r>
-            <a:endParaRPr lang="ko-KR" altLang="en-US"/>
           </a:p>
         </p:txBody>
       </p:sp>
@@ -2305,7 +2293,7 @@
           <a:p>
             <a:pPr lvl="0"/>
             <a:r>
-              <a:rPr lang="ko-KR" altLang="en-US" smtClean="0"/>
+              <a:rPr lang="ko-KR" altLang="en-US"/>
               <a:t>마스터 텍스트 스타일을 편집합니다</a:t>
             </a:r>
           </a:p>
@@ -2333,38 +2321,37 @@
           <a:p>
             <a:pPr lvl="0"/>
             <a:r>
-              <a:rPr lang="ko-KR" altLang="en-US" smtClean="0"/>
+              <a:rPr lang="ko-KR" altLang="en-US"/>
               <a:t>마스터 텍스트 스타일을 편집합니다</a:t>
             </a:r>
           </a:p>
           <a:p>
             <a:pPr lvl="1"/>
             <a:r>
-              <a:rPr lang="ko-KR" altLang="en-US" smtClean="0"/>
+              <a:rPr lang="ko-KR" altLang="en-US"/>
               <a:t>둘째 수준</a:t>
             </a:r>
           </a:p>
           <a:p>
             <a:pPr lvl="2"/>
             <a:r>
-              <a:rPr lang="ko-KR" altLang="en-US" smtClean="0"/>
+              <a:rPr lang="ko-KR" altLang="en-US"/>
               <a:t>셋째 수준</a:t>
             </a:r>
           </a:p>
           <a:p>
             <a:pPr lvl="3"/>
             <a:r>
-              <a:rPr lang="ko-KR" altLang="en-US" smtClean="0"/>
+              <a:rPr lang="ko-KR" altLang="en-US"/>
               <a:t>넷째 수준</a:t>
             </a:r>
           </a:p>
           <a:p>
             <a:pPr lvl="4"/>
             <a:r>
-              <a:rPr lang="ko-KR" altLang="en-US" smtClean="0"/>
+              <a:rPr lang="ko-KR" altLang="en-US"/>
               <a:t>다섯째 수준</a:t>
             </a:r>
-            <a:endParaRPr lang="ko-KR" altLang="en-US"/>
           </a:p>
         </p:txBody>
       </p:sp>
@@ -2427,7 +2414,7 @@
           <a:p>
             <a:pPr lvl="0"/>
             <a:r>
-              <a:rPr lang="ko-KR" altLang="en-US" smtClean="0"/>
+              <a:rPr lang="ko-KR" altLang="en-US"/>
               <a:t>마스터 텍스트 스타일을 편집합니다</a:t>
             </a:r>
           </a:p>
@@ -2455,38 +2442,37 @@
           <a:p>
             <a:pPr lvl="0"/>
             <a:r>
-              <a:rPr lang="ko-KR" altLang="en-US" smtClean="0"/>
+              <a:rPr lang="ko-KR" altLang="en-US"/>
               <a:t>마스터 텍스트 스타일을 편집합니다</a:t>
             </a:r>
           </a:p>
           <a:p>
             <a:pPr lvl="1"/>
             <a:r>
-              <a:rPr lang="ko-KR" altLang="en-US" smtClean="0"/>
+              <a:rPr lang="ko-KR" altLang="en-US"/>
               <a:t>둘째 수준</a:t>
             </a:r>
           </a:p>
           <a:p>
             <a:pPr lvl="2"/>
             <a:r>
-              <a:rPr lang="ko-KR" altLang="en-US" smtClean="0"/>
+              <a:rPr lang="ko-KR" altLang="en-US"/>
               <a:t>셋째 수준</a:t>
             </a:r>
           </a:p>
           <a:p>
             <a:pPr lvl="3"/>
             <a:r>
-              <a:rPr lang="ko-KR" altLang="en-US" smtClean="0"/>
+              <a:rPr lang="ko-KR" altLang="en-US"/>
               <a:t>넷째 수준</a:t>
             </a:r>
           </a:p>
           <a:p>
             <a:pPr lvl="4"/>
             <a:r>
-              <a:rPr lang="ko-KR" altLang="en-US" smtClean="0"/>
+              <a:rPr lang="ko-KR" altLang="en-US"/>
               <a:t>다섯째 수준</a:t>
             </a:r>
-            <a:endParaRPr lang="ko-KR" altLang="en-US"/>
           </a:p>
         </p:txBody>
       </p:sp>
@@ -2507,7 +2493,7 @@
           <a:p>
             <a:fld id="{9F6F6247-C8E0-4D66-A20E-9FC1B7784E7A}" type="datetimeFigureOut">
               <a:rPr lang="ko-KR" altLang="en-US" smtClean="0"/>
-              <a:t>2024-11-15</a:t>
+              <a:t>2024. 11. 14.</a:t>
             </a:fld>
             <a:endParaRPr lang="ko-KR" altLang="en-US"/>
           </a:p>
@@ -2601,10 +2587,9 @@
           <a:lstStyle/>
           <a:p>
             <a:r>
-              <a:rPr lang="ko-KR" altLang="en-US" smtClean="0"/>
+              <a:rPr lang="ko-KR" altLang="en-US"/>
               <a:t>마스터 제목 스타일 편집</a:t>
             </a:r>
-            <a:endParaRPr lang="ko-KR" altLang="en-US"/>
           </a:p>
         </p:txBody>
       </p:sp>
@@ -2625,7 +2610,7 @@
           <a:p>
             <a:fld id="{9F6F6247-C8E0-4D66-A20E-9FC1B7784E7A}" type="datetimeFigureOut">
               <a:rPr lang="ko-KR" altLang="en-US" smtClean="0"/>
-              <a:t>2024-11-15</a:t>
+              <a:t>2024. 11. 14.</a:t>
             </a:fld>
             <a:endParaRPr lang="ko-KR" altLang="en-US"/>
           </a:p>
@@ -2720,7 +2705,7 @@
           <a:p>
             <a:fld id="{9F6F6247-C8E0-4D66-A20E-9FC1B7784E7A}" type="datetimeFigureOut">
               <a:rPr lang="ko-KR" altLang="en-US" smtClean="0"/>
-              <a:t>2024-11-15</a:t>
+              <a:t>2024. 11. 14.</a:t>
             </a:fld>
             <a:endParaRPr lang="ko-KR" altLang="en-US"/>
           </a:p>
@@ -2823,10 +2808,9 @@
           </a:lstStyle>
           <a:p>
             <a:r>
-              <a:rPr lang="ko-KR" altLang="en-US" smtClean="0"/>
+              <a:rPr lang="ko-KR" altLang="en-US"/>
               <a:t>마스터 제목 스타일 편집</a:t>
             </a:r>
-            <a:endParaRPr lang="ko-KR" altLang="en-US"/>
           </a:p>
         </p:txBody>
       </p:sp>
@@ -2880,38 +2864,37 @@
           <a:p>
             <a:pPr lvl="0"/>
             <a:r>
-              <a:rPr lang="ko-KR" altLang="en-US" smtClean="0"/>
+              <a:rPr lang="ko-KR" altLang="en-US"/>
               <a:t>마스터 텍스트 스타일을 편집합니다</a:t>
             </a:r>
           </a:p>
           <a:p>
             <a:pPr lvl="1"/>
             <a:r>
-              <a:rPr lang="ko-KR" altLang="en-US" smtClean="0"/>
+              <a:rPr lang="ko-KR" altLang="en-US"/>
               <a:t>둘째 수준</a:t>
             </a:r>
           </a:p>
           <a:p>
             <a:pPr lvl="2"/>
             <a:r>
-              <a:rPr lang="ko-KR" altLang="en-US" smtClean="0"/>
+              <a:rPr lang="ko-KR" altLang="en-US"/>
               <a:t>셋째 수준</a:t>
             </a:r>
           </a:p>
           <a:p>
             <a:pPr lvl="3"/>
             <a:r>
-              <a:rPr lang="ko-KR" altLang="en-US" smtClean="0"/>
+              <a:rPr lang="ko-KR" altLang="en-US"/>
               <a:t>넷째 수준</a:t>
             </a:r>
           </a:p>
           <a:p>
             <a:pPr lvl="4"/>
             <a:r>
-              <a:rPr lang="ko-KR" altLang="en-US" smtClean="0"/>
+              <a:rPr lang="ko-KR" altLang="en-US"/>
               <a:t>다섯째 수준</a:t>
             </a:r>
-            <a:endParaRPr lang="ko-KR" altLang="en-US"/>
           </a:p>
         </p:txBody>
       </p:sp>
@@ -2974,7 +2957,7 @@
           <a:p>
             <a:pPr lvl="0"/>
             <a:r>
-              <a:rPr lang="ko-KR" altLang="en-US" smtClean="0"/>
+              <a:rPr lang="ko-KR" altLang="en-US"/>
               <a:t>마스터 텍스트 스타일을 편집합니다</a:t>
             </a:r>
           </a:p>
@@ -2997,7 +2980,7 @@
           <a:p>
             <a:fld id="{9F6F6247-C8E0-4D66-A20E-9FC1B7784E7A}" type="datetimeFigureOut">
               <a:rPr lang="ko-KR" altLang="en-US" smtClean="0"/>
-              <a:t>2024-11-15</a:t>
+              <a:t>2024. 11. 14.</a:t>
             </a:fld>
             <a:endParaRPr lang="ko-KR" altLang="en-US"/>
           </a:p>
@@ -3100,10 +3083,9 @@
           </a:lstStyle>
           <a:p>
             <a:r>
-              <a:rPr lang="ko-KR" altLang="en-US" smtClean="0"/>
+              <a:rPr lang="ko-KR" altLang="en-US"/>
               <a:t>마스터 제목 스타일 편집</a:t>
             </a:r>
-            <a:endParaRPr lang="ko-KR" altLang="en-US"/>
           </a:p>
         </p:txBody>
       </p:sp>
@@ -3227,7 +3209,7 @@
           <a:p>
             <a:pPr lvl="0"/>
             <a:r>
-              <a:rPr lang="ko-KR" altLang="en-US" smtClean="0"/>
+              <a:rPr lang="ko-KR" altLang="en-US"/>
               <a:t>마스터 텍스트 스타일을 편집합니다</a:t>
             </a:r>
           </a:p>
@@ -3250,7 +3232,7 @@
           <a:p>
             <a:fld id="{9F6F6247-C8E0-4D66-A20E-9FC1B7784E7A}" type="datetimeFigureOut">
               <a:rPr lang="ko-KR" altLang="en-US" smtClean="0"/>
-              <a:t>2024-11-15</a:t>
+              <a:t>2024. 11. 14.</a:t>
             </a:fld>
             <a:endParaRPr lang="ko-KR" altLang="en-US"/>
           </a:p>
@@ -3359,10 +3341,9 @@
           <a:lstStyle/>
           <a:p>
             <a:r>
-              <a:rPr lang="ko-KR" altLang="en-US" smtClean="0"/>
+              <a:rPr lang="ko-KR" altLang="en-US"/>
               <a:t>마스터 제목 스타일 편집</a:t>
             </a:r>
-            <a:endParaRPr lang="ko-KR" altLang="en-US"/>
           </a:p>
         </p:txBody>
       </p:sp>
@@ -3393,38 +3374,37 @@
           <a:p>
             <a:pPr lvl="0"/>
             <a:r>
-              <a:rPr lang="ko-KR" altLang="en-US" smtClean="0"/>
+              <a:rPr lang="ko-KR" altLang="en-US"/>
               <a:t>마스터 텍스트 스타일을 편집합니다</a:t>
             </a:r>
           </a:p>
           <a:p>
             <a:pPr lvl="1"/>
             <a:r>
-              <a:rPr lang="ko-KR" altLang="en-US" smtClean="0"/>
+              <a:rPr lang="ko-KR" altLang="en-US"/>
               <a:t>둘째 수준</a:t>
             </a:r>
           </a:p>
           <a:p>
             <a:pPr lvl="2"/>
             <a:r>
-              <a:rPr lang="ko-KR" altLang="en-US" smtClean="0"/>
+              <a:rPr lang="ko-KR" altLang="en-US"/>
               <a:t>셋째 수준</a:t>
             </a:r>
           </a:p>
           <a:p>
             <a:pPr lvl="3"/>
             <a:r>
-              <a:rPr lang="ko-KR" altLang="en-US" smtClean="0"/>
+              <a:rPr lang="ko-KR" altLang="en-US"/>
               <a:t>넷째 수준</a:t>
             </a:r>
           </a:p>
           <a:p>
             <a:pPr lvl="4"/>
             <a:r>
-              <a:rPr lang="ko-KR" altLang="en-US" smtClean="0"/>
+              <a:rPr lang="ko-KR" altLang="en-US"/>
               <a:t>다섯째 수준</a:t>
             </a:r>
-            <a:endParaRPr lang="ko-KR" altLang="en-US"/>
           </a:p>
         </p:txBody>
       </p:sp>
@@ -3463,7 +3443,7 @@
           <a:p>
             <a:fld id="{9F6F6247-C8E0-4D66-A20E-9FC1B7784E7A}" type="datetimeFigureOut">
               <a:rPr lang="ko-KR" altLang="en-US" smtClean="0"/>
-              <a:t>2024-11-15</a:t>
+              <a:t>2024. 11. 14.</a:t>
             </a:fld>
             <a:endParaRPr lang="ko-KR" altLang="en-US"/>
           </a:p>
@@ -4105,7 +4085,7 @@
               </a:lnSpc>
             </a:pPr>
             <a:r>
-              <a:rPr lang="en-US" altLang="ko-KR" sz="6400" spc="-133" smtClean="0">
+              <a:rPr lang="en-US" altLang="ko-KR" sz="6400" spc="-133">
                 <a:solidFill>
                   <a:srgbClr val="000000"/>
                 </a:solidFill>
@@ -4149,16 +4129,26 @@
               </a:lnSpc>
             </a:pPr>
             <a:r>
-              <a:rPr lang="en-US" altLang="ko-KR" sz="8734" spc="-133">
+              <a:rPr lang="en-US" altLang="ko-KR" sz="8734" spc="-133" dirty="0">
                 <a:solidFill>
                   <a:srgbClr val="000000"/>
                 </a:solidFill>
                 <a:latin typeface="나눔스퀘어_ac ExtraBold" panose="020B0600000101010101" pitchFamily="50" charset="-127"/>
                 <a:ea typeface="나눔스퀘어_ac ExtraBold" panose="020B0600000101010101" pitchFamily="50" charset="-127"/>
               </a:rPr>
-              <a:t>Perfect StudyMate</a:t>
+              <a:t>Perfect </a:t>
             </a:r>
-            <a:endParaRPr lang="ko-KR" altLang="en-US" sz="8734" spc="-133">
+            <a:r>
+              <a:rPr lang="en-US" altLang="ko-KR" sz="8734" spc="-133" dirty="0" err="1">
+                <a:solidFill>
+                  <a:srgbClr val="000000"/>
+                </a:solidFill>
+                <a:latin typeface="나눔스퀘어_ac ExtraBold" panose="020B0600000101010101" pitchFamily="50" charset="-127"/>
+                <a:ea typeface="나눔스퀘어_ac ExtraBold" panose="020B0600000101010101" pitchFamily="50" charset="-127"/>
+              </a:rPr>
+              <a:t>StudyMate</a:t>
+            </a:r>
+            <a:endParaRPr lang="ko-KR" altLang="en-US" sz="8734" spc="-133" dirty="0">
               <a:solidFill>
                 <a:srgbClr val="000000"/>
               </a:solidFill>
@@ -4374,7 +4364,7 @@
               </a:lnSpc>
             </a:pPr>
             <a:r>
-              <a:rPr lang="en-US" altLang="ko-KR" sz="2667" smtClean="0">
+              <a:rPr lang="en-US" altLang="ko-KR" sz="2667">
                 <a:solidFill>
                   <a:srgbClr val="000000"/>
                 </a:solidFill>
@@ -4416,7 +4406,7 @@
           <a:lstStyle/>
           <a:p>
             <a:r>
-              <a:rPr lang="en-US" altLang="ko-KR" sz="2400" smtClean="0">
+              <a:rPr lang="en-US" altLang="ko-KR" sz="2400">
                 <a:latin typeface="나눔스퀘어_ac Bold" panose="020B0600000101010101" pitchFamily="50" charset="-127"/>
                 <a:ea typeface="나눔스퀘어_ac Bold" panose="020B0600000101010101" pitchFamily="50" charset="-127"/>
               </a:rPr>
@@ -4492,7 +4482,7 @@
           <a:p>
             <a:pPr algn="ctr"/>
             <a:r>
-              <a:rPr lang="en-US" altLang="ko-KR" sz="2000" smtClean="0">
+              <a:rPr lang="en-US" altLang="ko-KR" sz="2000">
                 <a:solidFill>
                   <a:schemeClr val="bg1"/>
                 </a:solidFill>
@@ -4553,7 +4543,7 @@
                 </a:lnSpc>
               </a:pPr>
               <a:r>
-                <a:rPr lang="en-US" altLang="ko-KR" smtClean="0">
+                <a:rPr lang="en-US" altLang="ko-KR">
                   <a:latin typeface="나눔스퀘어_ac" panose="020B0600000101010101" pitchFamily="50" charset="-127"/>
                   <a:ea typeface="나눔스퀘어_ac" panose="020B0600000101010101" pitchFamily="50" charset="-127"/>
                 </a:rPr>
@@ -4567,7 +4557,7 @@
                 </a:lnSpc>
               </a:pPr>
               <a:r>
-                <a:rPr lang="en-US" altLang="ko-KR" smtClean="0">
+                <a:rPr lang="en-US" altLang="ko-KR">
                   <a:latin typeface="나눔스퀘어_ac" panose="020B0600000101010101" pitchFamily="50" charset="-127"/>
                   <a:ea typeface="나눔스퀘어_ac" panose="020B0600000101010101" pitchFamily="50" charset="-127"/>
                 </a:rPr>
@@ -4581,23 +4571,12 @@
                 </a:lnSpc>
               </a:pPr>
               <a:r>
-                <a:rPr lang="en-US" altLang="ko-KR" smtClean="0">
+                <a:rPr lang="en-US" altLang="ko-KR">
                   <a:latin typeface="나눔스퀘어_ac" panose="020B0600000101010101" pitchFamily="50" charset="-127"/>
                   <a:ea typeface="나눔스퀘어_ac" panose="020B0600000101010101" pitchFamily="50" charset="-127"/>
                 </a:rPr>
-                <a:t>that helps to write b</a:t>
+                <a:t>that helps to write better programs.</a:t>
               </a:r>
-              <a:r>
-                <a:rPr lang="en-US" altLang="ko-KR" smtClean="0">
-                  <a:latin typeface="나눔스퀘어_ac" panose="020B0600000101010101" pitchFamily="50" charset="-127"/>
-                  <a:ea typeface="나눔스퀘어_ac" panose="020B0600000101010101" pitchFamily="50" charset="-127"/>
-                </a:rPr>
-                <a:t>etter programs.</a:t>
-              </a:r>
-              <a:endParaRPr lang="en-US" altLang="ko-KR" smtClean="0">
-                <a:latin typeface="나눔스퀘어_ac" panose="020B0600000101010101" pitchFamily="50" charset="-127"/>
-                <a:ea typeface="나눔스퀘어_ac" panose="020B0600000101010101" pitchFamily="50" charset="-127"/>
-              </a:endParaRPr>
             </a:p>
           </p:txBody>
         </p:sp>
@@ -4670,16 +4649,12 @@
                 </a:lnSpc>
               </a:pPr>
               <a:r>
-                <a:rPr lang="en-US" altLang="ko-KR" smtClean="0">
+                <a:rPr lang="en-US" altLang="ko-KR">
                   <a:latin typeface="나눔스퀘어_ac" panose="020B0600000101010101" pitchFamily="50" charset="-127"/>
                   <a:ea typeface="나눔스퀘어_ac" panose="020B0600000101010101" pitchFamily="50" charset="-127"/>
                 </a:rPr>
                 <a:t>Test implemented API by using Pytest</a:t>
               </a:r>
-              <a:endParaRPr lang="en-US" altLang="ko-KR" smtClean="0">
-                <a:latin typeface="나눔스퀘어_ac" panose="020B0600000101010101" pitchFamily="50" charset="-127"/>
-                <a:ea typeface="나눔스퀘어_ac" panose="020B0600000101010101" pitchFamily="50" charset="-127"/>
-              </a:endParaRPr>
             </a:p>
           </p:txBody>
         </p:sp>
@@ -4694,13 +4669,6 @@
   <p:clrMapOvr>
     <a:masterClrMapping/>
   </p:clrMapOvr>
-  <p:timing>
-    <p:tnLst>
-      <p:par>
-        <p:cTn id="1" dur="indefinite" restart="never" nodeType="tmRoot"/>
-      </p:par>
-    </p:tnLst>
-  </p:timing>
 </p:sld>
 </file>
 
@@ -4818,7 +4786,7 @@
               </a:lnSpc>
             </a:pPr>
             <a:r>
-              <a:rPr lang="en-US" altLang="ko-KR" sz="2667" smtClean="0">
+              <a:rPr lang="en-US" altLang="ko-KR" sz="2667">
                 <a:solidFill>
                   <a:srgbClr val="000000"/>
                 </a:solidFill>
@@ -4860,7 +4828,7 @@
           <a:lstStyle/>
           <a:p>
             <a:r>
-              <a:rPr lang="en-US" altLang="ko-KR" sz="2400" smtClean="0">
+              <a:rPr lang="en-US" altLang="ko-KR" sz="2400">
                 <a:latin typeface="나눔스퀘어_ac Bold" panose="020B0600000101010101" pitchFamily="50" charset="-127"/>
                 <a:ea typeface="나눔스퀘어_ac Bold" panose="020B0600000101010101" pitchFamily="50" charset="-127"/>
               </a:rPr>
@@ -4896,7 +4864,7 @@
           <a:lstStyle/>
           <a:p>
             <a:r>
-              <a:rPr lang="en-US" altLang="ko-KR" sz="2000" smtClean="0">
+              <a:rPr lang="en-US" altLang="ko-KR" sz="2000">
                 <a:latin typeface="나눔스퀘어_ac" panose="020B0600000101010101" pitchFamily="50" charset="-127"/>
                 <a:ea typeface="나눔스퀘어_ac" panose="020B0600000101010101" pitchFamily="50" charset="-127"/>
               </a:rPr>
@@ -5140,13 +5108,6 @@
   <p:clrMapOvr>
     <a:masterClrMapping/>
   </p:clrMapOvr>
-  <p:timing>
-    <p:tnLst>
-      <p:par>
-        <p:cTn id="1" dur="indefinite" restart="never" nodeType="tmRoot"/>
-      </p:par>
-    </p:tnLst>
-  </p:timing>
 </p:sld>
 </file>
 
@@ -5264,7 +5225,7 @@
               </a:lnSpc>
             </a:pPr>
             <a:r>
-              <a:rPr lang="en-US" altLang="ko-KR" sz="2667" smtClean="0">
+              <a:rPr lang="en-US" altLang="ko-KR" sz="2667">
                 <a:solidFill>
                   <a:srgbClr val="000000"/>
                 </a:solidFill>
@@ -5306,7 +5267,7 @@
           <a:lstStyle/>
           <a:p>
             <a:r>
-              <a:rPr lang="en-US" altLang="ko-KR" sz="2400" smtClean="0">
+              <a:rPr lang="en-US" altLang="ko-KR" sz="2400">
                 <a:latin typeface="나눔스퀘어_ac Bold" panose="020B0600000101010101" pitchFamily="50" charset="-127"/>
                 <a:ea typeface="나눔스퀘어_ac Bold" panose="020B0600000101010101" pitchFamily="50" charset="-127"/>
               </a:rPr>
@@ -5347,7 +5308,7 @@
           <a:p>
             <a:pPr algn="ctr"/>
             <a:r>
-              <a:rPr lang="en-US" altLang="ko-KR" sz="2000" smtClean="0">
+              <a:rPr lang="en-US" altLang="ko-KR" sz="2000">
                 <a:solidFill>
                   <a:schemeClr val="bg1"/>
                 </a:solidFill>
@@ -5597,13 +5558,13 @@
                 <a:buNone/>
               </a:pPr>
               <a:r>
-                <a:rPr lang="ko" smtClean="0">
+                <a:rPr lang="ko">
                   <a:latin typeface="나눔스퀘어_ac Bold" panose="020B0600000101010101" pitchFamily="50" charset="-127"/>
                   <a:ea typeface="나눔스퀘어_ac Bold" panose="020B0600000101010101" pitchFamily="50" charset="-127"/>
                 </a:rPr>
                 <a:t>Vector</a:t>
               </a:r>
-              <a:endParaRPr lang="en-US" altLang="ko" smtClean="0">
+              <a:endParaRPr lang="en-US" altLang="ko">
                 <a:latin typeface="나눔스퀘어_ac Bold" panose="020B0600000101010101" pitchFamily="50" charset="-127"/>
                 <a:ea typeface="나눔스퀘어_ac Bold" panose="020B0600000101010101" pitchFamily="50" charset="-127"/>
               </a:endParaRPr>
@@ -5619,7 +5580,7 @@
                 <a:buNone/>
               </a:pPr>
               <a:r>
-                <a:rPr lang="ko" smtClean="0">
+                <a:rPr lang="ko">
                   <a:latin typeface="나눔스퀘어_ac Bold" panose="020B0600000101010101" pitchFamily="50" charset="-127"/>
                   <a:ea typeface="나눔스퀘어_ac Bold" panose="020B0600000101010101" pitchFamily="50" charset="-127"/>
                 </a:rPr>
@@ -5677,13 +5638,13 @@
                 <a:buNone/>
               </a:pPr>
               <a:r>
-                <a:rPr lang="ko" smtClean="0">
+                <a:rPr lang="ko" dirty="0">
                   <a:latin typeface="나눔스퀘어_ac Bold" panose="020B0600000101010101" pitchFamily="50" charset="-127"/>
                   <a:ea typeface="나눔스퀘어_ac Bold" panose="020B0600000101010101" pitchFamily="50" charset="-127"/>
                 </a:rPr>
                 <a:t>S3</a:t>
               </a:r>
-              <a:endParaRPr lang="en-US" altLang="ko" smtClean="0">
+              <a:endParaRPr lang="en-US" altLang="ko" dirty="0">
                 <a:latin typeface="나눔스퀘어_ac Bold" panose="020B0600000101010101" pitchFamily="50" charset="-127"/>
                 <a:ea typeface="나눔스퀘어_ac Bold" panose="020B0600000101010101" pitchFamily="50" charset="-127"/>
               </a:endParaRPr>
@@ -5699,13 +5660,13 @@
                 <a:buNone/>
               </a:pPr>
               <a:r>
-                <a:rPr lang="ko" smtClean="0">
+                <a:rPr lang="en-US" dirty="0">
                   <a:latin typeface="나눔스퀘어_ac Bold" panose="020B0600000101010101" pitchFamily="50" charset="-127"/>
                   <a:ea typeface="나눔스퀘어_ac Bold" panose="020B0600000101010101" pitchFamily="50" charset="-127"/>
                 </a:rPr>
-                <a:t>Database</a:t>
+                <a:t>Storage</a:t>
               </a:r>
-              <a:endParaRPr>
+              <a:endParaRPr dirty="0">
                 <a:latin typeface="나눔스퀘어_ac Bold" panose="020B0600000101010101" pitchFamily="50" charset="-127"/>
                 <a:ea typeface="나눔스퀘어_ac Bold" panose="020B0600000101010101" pitchFamily="50" charset="-127"/>
               </a:endParaRPr>
@@ -5871,7 +5832,7 @@
                 </a:lnSpc>
               </a:pPr>
               <a:r>
-                <a:rPr lang="en-US" altLang="ko-KR" sz="2000" smtClean="0">
+                <a:rPr lang="en-US" altLang="ko-KR" sz="2000">
                   <a:latin typeface="나눔스퀘어_ac" panose="020B0600000101010101" pitchFamily="50" charset="-127"/>
                   <a:ea typeface="나눔스퀘어_ac" panose="020B0600000101010101" pitchFamily="50" charset="-127"/>
                 </a:rPr>
@@ -5885,7 +5846,7 @@
                 </a:lnSpc>
               </a:pPr>
               <a:r>
-                <a:rPr lang="en-US" altLang="ko-KR" sz="2000" smtClean="0">
+                <a:rPr lang="en-US" altLang="ko-KR" sz="2000">
                   <a:latin typeface="나눔스퀘어_ac" panose="020B0600000101010101" pitchFamily="50" charset="-127"/>
                   <a:ea typeface="나눔스퀘어_ac" panose="020B0600000101010101" pitchFamily="50" charset="-127"/>
                 </a:rPr>
@@ -5985,7 +5946,7 @@
                 </a:lnSpc>
               </a:pPr>
               <a:r>
-                <a:rPr lang="en-US" altLang="ko-KR" sz="2000" smtClean="0">
+                <a:rPr lang="en-US" altLang="ko-KR" sz="2000">
                   <a:latin typeface="나눔스퀘어_ac" panose="020B0600000101010101" pitchFamily="50" charset="-127"/>
                   <a:ea typeface="나눔스퀘어_ac" panose="020B0600000101010101" pitchFamily="50" charset="-127"/>
                 </a:rPr>
@@ -5999,7 +5960,7 @@
                 </a:lnSpc>
               </a:pPr>
               <a:r>
-                <a:rPr lang="en-US" altLang="ko-KR" sz="2000" smtClean="0">
+                <a:rPr lang="en-US" altLang="ko-KR" sz="2000">
                   <a:latin typeface="나눔스퀘어_ac" panose="020B0600000101010101" pitchFamily="50" charset="-127"/>
                   <a:ea typeface="나눔스퀘어_ac" panose="020B0600000101010101" pitchFamily="50" charset="-127"/>
                 </a:rPr>
@@ -6099,7 +6060,7 @@
                 </a:lnSpc>
               </a:pPr>
               <a:r>
-                <a:rPr lang="en-US" altLang="ko-KR" sz="2000" smtClean="0">
+                <a:rPr lang="en-US" altLang="ko-KR" sz="2000">
                   <a:latin typeface="나눔스퀘어_ac" panose="020B0600000101010101" pitchFamily="50" charset="-127"/>
                   <a:ea typeface="나눔스퀘어_ac" panose="020B0600000101010101" pitchFamily="50" charset="-127"/>
                 </a:rPr>
@@ -6167,13 +6128,6 @@
   <p:clrMapOvr>
     <a:masterClrMapping/>
   </p:clrMapOvr>
-  <p:timing>
-    <p:tnLst>
-      <p:par>
-        <p:cTn id="1" dur="indefinite" restart="never" nodeType="tmRoot"/>
-      </p:par>
-    </p:tnLst>
-  </p:timing>
 </p:sld>
 </file>
 
@@ -6291,7 +6245,7 @@
               </a:lnSpc>
             </a:pPr>
             <a:r>
-              <a:rPr lang="en-US" altLang="ko-KR" sz="2667" smtClean="0">
+              <a:rPr lang="en-US" altLang="ko-KR" sz="2667">
                 <a:solidFill>
                   <a:srgbClr val="000000"/>
                 </a:solidFill>
@@ -6333,7 +6287,7 @@
           <a:lstStyle/>
           <a:p>
             <a:r>
-              <a:rPr lang="en-US" altLang="ko-KR" sz="2400" smtClean="0">
+              <a:rPr lang="en-US" altLang="ko-KR" sz="2400">
                 <a:latin typeface="나눔스퀘어_ac Bold" panose="020B0600000101010101" pitchFamily="50" charset="-127"/>
                 <a:ea typeface="나눔스퀘어_ac Bold" panose="020B0600000101010101" pitchFamily="50" charset="-127"/>
               </a:rPr>
@@ -6386,7 +6340,7 @@
             <a:p>
               <a:pPr algn="ctr"/>
               <a:r>
-                <a:rPr lang="en-US" altLang="ko-KR" smtClean="0">
+                <a:rPr lang="en-US" altLang="ko-KR">
                   <a:latin typeface="나눔스퀘어_ac Bold" panose="020B0600000101010101" pitchFamily="50" charset="-127"/>
                   <a:ea typeface="나눔스퀘어_ac Bold" panose="020B0600000101010101" pitchFamily="50" charset="-127"/>
                 </a:rPr>
@@ -6426,13 +6380,13 @@
                 </a:lnSpc>
               </a:pPr>
               <a:r>
-                <a:rPr lang="ko" altLang="ko-KR" smtClean="0">
+                <a:rPr lang="ko" altLang="ko-KR">
                   <a:latin typeface="나눔스퀘어_ac" panose="020B0600000101010101" pitchFamily="50" charset="-127"/>
                   <a:ea typeface="나눔스퀘어_ac" panose="020B0600000101010101" pitchFamily="50" charset="-127"/>
                 </a:rPr>
                 <a:t>contains methods for initialization of the model,</a:t>
               </a:r>
-              <a:endParaRPr lang="en-US" altLang="ko" smtClean="0">
+              <a:endParaRPr lang="en-US" altLang="ko">
                 <a:latin typeface="나눔스퀘어_ac" panose="020B0600000101010101" pitchFamily="50" charset="-127"/>
                 <a:ea typeface="나눔스퀘어_ac" panose="020B0600000101010101" pitchFamily="50" charset="-127"/>
               </a:endParaRPr>
@@ -6444,7 +6398,7 @@
                 </a:lnSpc>
               </a:pPr>
               <a:r>
-                <a:rPr lang="ko" altLang="ko-KR" smtClean="0">
+                <a:rPr lang="ko" altLang="ko-KR">
                   <a:latin typeface="나눔스퀘어_ac" panose="020B0600000101010101" pitchFamily="50" charset="-127"/>
                   <a:ea typeface="나눔스퀘어_ac" panose="020B0600000101010101" pitchFamily="50" charset="-127"/>
                 </a:rPr>
@@ -6483,7 +6437,7 @@
             <a:p>
               <a:pPr algn="ctr"/>
               <a:r>
-                <a:rPr lang="en-US" altLang="ko-KR" smtClean="0">
+                <a:rPr lang="en-US" altLang="ko-KR">
                   <a:latin typeface="나눔스퀘어_ac Bold" panose="020B0600000101010101" pitchFamily="50" charset="-127"/>
                   <a:ea typeface="나눔스퀘어_ac Bold" panose="020B0600000101010101" pitchFamily="50" charset="-127"/>
                 </a:rPr>
@@ -6493,7 +6447,7 @@
             <a:p>
               <a:pPr algn="ctr"/>
               <a:r>
-                <a:rPr lang="en-US" altLang="ko-KR" smtClean="0">
+                <a:rPr lang="en-US" altLang="ko-KR">
                   <a:latin typeface="나눔스퀘어_ac Bold" panose="020B0600000101010101" pitchFamily="50" charset="-127"/>
                   <a:ea typeface="나눔스퀘어_ac Bold" panose="020B0600000101010101" pitchFamily="50" charset="-127"/>
                 </a:rPr>
@@ -6534,7 +6488,7 @@
                 <a:buSzPts val="1800"/>
               </a:pPr>
               <a:r>
-                <a:rPr lang="en-US" altLang="ko" smtClean="0">
+                <a:rPr lang="en-US" altLang="ko">
                   <a:latin typeface="나눔스퀘어_ac" panose="020B0600000101010101" pitchFamily="50" charset="-127"/>
                   <a:ea typeface="나눔스퀘어_ac" panose="020B0600000101010101" pitchFamily="50" charset="-127"/>
                 </a:rPr>
@@ -6549,7 +6503,7 @@
                 <a:buSzPts val="1800"/>
               </a:pPr>
               <a:r>
-                <a:rPr lang="en-US" altLang="ko" smtClean="0">
+                <a:rPr lang="en-US" altLang="ko">
                   <a:latin typeface="나눔스퀘어_ac" panose="020B0600000101010101" pitchFamily="50" charset="-127"/>
                   <a:ea typeface="나눔스퀘어_ac" panose="020B0600000101010101" pitchFamily="50" charset="-127"/>
                 </a:rPr>
@@ -6573,13 +6527,6 @@
   <p:clrMapOvr>
     <a:masterClrMapping/>
   </p:clrMapOvr>
-  <p:timing>
-    <p:tnLst>
-      <p:par>
-        <p:cTn id="1" dur="indefinite" restart="never" nodeType="tmRoot"/>
-      </p:par>
-    </p:tnLst>
-  </p:timing>
 </p:sld>
 </file>
 
@@ -6697,7 +6644,7 @@
               </a:lnSpc>
             </a:pPr>
             <a:r>
-              <a:rPr lang="en-US" altLang="ko-KR" sz="2667" smtClean="0">
+              <a:rPr lang="en-US" altLang="ko-KR" sz="2667">
                 <a:solidFill>
                   <a:srgbClr val="000000"/>
                 </a:solidFill>
@@ -6739,7 +6686,7 @@
           <a:lstStyle/>
           <a:p>
             <a:r>
-              <a:rPr lang="en-US" altLang="ko-KR" sz="2400" smtClean="0">
+              <a:rPr lang="en-US" altLang="ko-KR" sz="2400">
                 <a:latin typeface="나눔스퀘어_ac Bold" panose="020B0600000101010101" pitchFamily="50" charset="-127"/>
                 <a:ea typeface="나눔스퀘어_ac Bold" panose="020B0600000101010101" pitchFamily="50" charset="-127"/>
               </a:rPr>
@@ -6946,13 +6893,13 @@
               <a:buNone/>
             </a:pPr>
             <a:r>
-              <a:rPr lang="en-US" altLang="ko" sz="1800" smtClean="0">
+              <a:rPr lang="en-US" altLang="ko" sz="1800">
                 <a:latin typeface="나눔스퀘어_ac" panose="020B0600000101010101" pitchFamily="50" charset="-127"/>
                 <a:ea typeface="나눔스퀘어_ac" panose="020B0600000101010101" pitchFamily="50" charset="-127"/>
               </a:rPr>
               <a:t>Exploring the idea of fine-tuning LLM model specifically for generating quizzes based on course material</a:t>
             </a:r>
-            <a:endParaRPr lang="en-US" sz="1800" smtClean="0">
+            <a:endParaRPr lang="en-US" sz="1800">
               <a:latin typeface="나눔스퀘어_ac" panose="020B0600000101010101" pitchFamily="50" charset="-127"/>
               <a:ea typeface="나눔스퀘어_ac" panose="020B0600000101010101" pitchFamily="50" charset="-127"/>
             </a:endParaRPr>
@@ -7082,7 +7029,7 @@
           <a:p>
             <a:pPr algn="ctr"/>
             <a:r>
-              <a:rPr lang="en-US" altLang="ko-KR" sz="2400" smtClean="0">
+              <a:rPr lang="en-US" altLang="ko-KR" sz="2400">
                 <a:latin typeface="나눔스퀘어_ac Bold" panose="020B0600000101010101" pitchFamily="50" charset="-127"/>
                 <a:ea typeface="나눔스퀘어_ac Bold" panose="020B0600000101010101" pitchFamily="50" charset="-127"/>
               </a:rPr>
@@ -7092,7 +7039,7 @@
           <a:p>
             <a:pPr algn="ctr"/>
             <a:r>
-              <a:rPr lang="en-US" altLang="ko-KR" sz="2400" smtClean="0">
+              <a:rPr lang="en-US" altLang="ko-KR" sz="2400">
                 <a:latin typeface="나눔스퀘어_ac Bold" panose="020B0600000101010101" pitchFamily="50" charset="-127"/>
                 <a:ea typeface="나눔스퀘어_ac Bold" panose="020B0600000101010101" pitchFamily="50" charset="-127"/>
               </a:rPr>
@@ -7129,7 +7076,7 @@
           <a:p>
             <a:pPr algn="ctr"/>
             <a:r>
-              <a:rPr lang="en-US" altLang="ko-KR" sz="2400" smtClean="0">
+              <a:rPr lang="en-US" altLang="ko-KR" sz="2400">
                 <a:latin typeface="나눔스퀘어_ac Bold" panose="020B0600000101010101" pitchFamily="50" charset="-127"/>
                 <a:ea typeface="나눔스퀘어_ac Bold" panose="020B0600000101010101" pitchFamily="50" charset="-127"/>
               </a:rPr>
@@ -7169,13 +7116,13 @@
               </a:lnSpc>
             </a:pPr>
             <a:r>
-              <a:rPr lang="ko-KR" altLang="en-US" smtClean="0">
+              <a:rPr lang="ko-KR" altLang="en-US">
                 <a:latin typeface="나눔스퀘어_ac" panose="020B0600000101010101" pitchFamily="50" charset="-127"/>
                 <a:ea typeface="나눔스퀘어_ac" panose="020B0600000101010101" pitchFamily="50" charset="-127"/>
               </a:rPr>
               <a:t>Improve the accuracy</a:t>
             </a:r>
-            <a:endParaRPr lang="en-US" altLang="ko-KR" smtClean="0">
+            <a:endParaRPr lang="en-US" altLang="ko-KR">
               <a:latin typeface="나눔스퀘어_ac" panose="020B0600000101010101" pitchFamily="50" charset="-127"/>
               <a:ea typeface="나눔스퀘어_ac" panose="020B0600000101010101" pitchFamily="50" charset="-127"/>
             </a:endParaRPr>
@@ -7187,16 +7134,12 @@
               </a:lnSpc>
             </a:pPr>
             <a:r>
-              <a:rPr lang="ko-KR" altLang="en-US" smtClean="0">
+              <a:rPr lang="ko-KR" altLang="en-US">
                 <a:latin typeface="나눔스퀘어_ac" panose="020B0600000101010101" pitchFamily="50" charset="-127"/>
                 <a:ea typeface="나눔스퀘어_ac" panose="020B0600000101010101" pitchFamily="50" charset="-127"/>
               </a:rPr>
               <a:t>of responses</a:t>
             </a:r>
-            <a:endParaRPr lang="ko-KR" altLang="en-US">
-              <a:latin typeface="나눔스퀘어_ac" panose="020B0600000101010101" pitchFamily="50" charset="-127"/>
-              <a:ea typeface="나눔스퀘어_ac" panose="020B0600000101010101" pitchFamily="50" charset="-127"/>
-            </a:endParaRPr>
           </a:p>
         </p:txBody>
       </p:sp>
@@ -7227,13 +7170,13 @@
               </a:lnSpc>
             </a:pPr>
             <a:r>
-              <a:rPr lang="ko-KR" altLang="en-US" smtClean="0">
+              <a:rPr lang="ko-KR" altLang="en-US">
                 <a:latin typeface="나눔스퀘어_ac" panose="020B0600000101010101" pitchFamily="50" charset="-127"/>
                 <a:ea typeface="나눔스퀘어_ac" panose="020B0600000101010101" pitchFamily="50" charset="-127"/>
               </a:rPr>
               <a:t>Access an external database</a:t>
             </a:r>
-            <a:endParaRPr lang="en-US" altLang="ko-KR" smtClean="0">
+            <a:endParaRPr lang="en-US" altLang="ko-KR">
               <a:latin typeface="나눔스퀘어_ac" panose="020B0600000101010101" pitchFamily="50" charset="-127"/>
               <a:ea typeface="나눔스퀘어_ac" panose="020B0600000101010101" pitchFamily="50" charset="-127"/>
             </a:endParaRPr>
@@ -7245,16 +7188,12 @@
               </a:lnSpc>
             </a:pPr>
             <a:r>
-              <a:rPr lang="ko-KR" altLang="en-US" smtClean="0">
+              <a:rPr lang="ko-KR" altLang="en-US">
                 <a:latin typeface="나눔스퀘어_ac" panose="020B0600000101010101" pitchFamily="50" charset="-127"/>
                 <a:ea typeface="나눔스퀘어_ac" panose="020B0600000101010101" pitchFamily="50" charset="-127"/>
               </a:rPr>
               <a:t>to generate a response</a:t>
             </a:r>
-            <a:endParaRPr lang="ko-KR" altLang="en-US">
-              <a:latin typeface="나눔스퀘어_ac" panose="020B0600000101010101" pitchFamily="50" charset="-127"/>
-              <a:ea typeface="나눔스퀘어_ac" panose="020B0600000101010101" pitchFamily="50" charset="-127"/>
-            </a:endParaRPr>
           </a:p>
         </p:txBody>
       </p:sp>
@@ -7285,7 +7224,7 @@
               </a:lnSpc>
             </a:pPr>
             <a:r>
-              <a:rPr lang="en-US" altLang="ko-KR" smtClean="0">
+              <a:rPr lang="en-US" altLang="ko-KR">
                 <a:latin typeface="나눔스퀘어_ac" panose="020B0600000101010101" pitchFamily="50" charset="-127"/>
                 <a:ea typeface="나눔스퀘어_ac" panose="020B0600000101010101" pitchFamily="50" charset="-127"/>
               </a:rPr>
@@ -7299,7 +7238,7 @@
               </a:lnSpc>
             </a:pPr>
             <a:r>
-              <a:rPr lang="en-US" altLang="ko-KR" smtClean="0">
+              <a:rPr lang="en-US" altLang="ko-KR">
                 <a:latin typeface="나눔스퀘어_ac" panose="020B0600000101010101" pitchFamily="50" charset="-127"/>
                 <a:ea typeface="나눔스퀘어_ac" panose="020B0600000101010101" pitchFamily="50" charset="-127"/>
               </a:rPr>
@@ -7313,7 +7252,7 @@
               </a:lnSpc>
             </a:pPr>
             <a:r>
-              <a:rPr lang="en-US" altLang="ko-KR" smtClean="0">
+              <a:rPr lang="en-US" altLang="ko-KR">
                 <a:latin typeface="나눔스퀘어_ac" panose="020B0600000101010101" pitchFamily="50" charset="-127"/>
                 <a:ea typeface="나눔스퀘어_ac" panose="020B0600000101010101" pitchFamily="50" charset="-127"/>
               </a:rPr>
@@ -7464,13 +7403,6 @@
   <p:clrMapOvr>
     <a:masterClrMapping/>
   </p:clrMapOvr>
-  <p:timing>
-    <p:tnLst>
-      <p:par>
-        <p:cTn id="1" dur="indefinite" restart="never" nodeType="tmRoot"/>
-      </p:par>
-    </p:tnLst>
-  </p:timing>
 </p:sld>
 </file>
 
@@ -7588,7 +7520,7 @@
               </a:lnSpc>
             </a:pPr>
             <a:r>
-              <a:rPr lang="en-US" altLang="ko-KR" sz="2667" smtClean="0">
+              <a:rPr lang="en-US" altLang="ko-KR" sz="2667">
                 <a:solidFill>
                   <a:srgbClr val="000000"/>
                 </a:solidFill>
@@ -7630,7 +7562,7 @@
           <a:lstStyle/>
           <a:p>
             <a:r>
-              <a:rPr lang="en-US" altLang="ko-KR" sz="2400" smtClean="0">
+              <a:rPr lang="en-US" altLang="ko-KR" sz="2400">
                 <a:latin typeface="나눔스퀘어_ac Bold" panose="020B0600000101010101" pitchFamily="50" charset="-127"/>
                 <a:ea typeface="나눔스퀘어_ac Bold" panose="020B0600000101010101" pitchFamily="50" charset="-127"/>
               </a:rPr>
@@ -7666,7 +7598,7 @@
           <a:lstStyle/>
           <a:p>
             <a:r>
-              <a:rPr lang="en-US" altLang="ko-KR" smtClean="0">
+              <a:rPr lang="en-US" altLang="ko-KR">
                 <a:latin typeface="나눔스퀘어_ac" panose="020B0600000101010101" pitchFamily="50" charset="-127"/>
                 <a:ea typeface="나눔스퀘어_ac" panose="020B0600000101010101" pitchFamily="50" charset="-127"/>
               </a:rPr>
@@ -7707,7 +7639,7 @@
           <a:p>
             <a:pPr algn="ctr"/>
             <a:r>
-              <a:rPr lang="en-US" altLang="ko-KR" sz="2000" smtClean="0">
+              <a:rPr lang="en-US" altLang="ko-KR" sz="2000">
                 <a:solidFill>
                   <a:schemeClr val="bg1"/>
                 </a:solidFill>
@@ -8022,7 +7954,7 @@
                   </a:lnSpc>
                 </a:pPr>
                 <a:r>
-                  <a:rPr lang="en-US" altLang="ko-KR" smtClean="0">
+                  <a:rPr lang="en-US" altLang="ko-KR">
                     <a:latin typeface="나눔스퀘어_ac" panose="020B0600000101010101" pitchFamily="50" charset="-127"/>
                     <a:ea typeface="나눔스퀘어_ac" panose="020B0600000101010101" pitchFamily="50" charset="-127"/>
                   </a:rPr>
@@ -8036,7 +7968,7 @@
                   </a:lnSpc>
                 </a:pPr>
                 <a:r>
-                  <a:rPr lang="en-US" altLang="ko-KR" smtClean="0">
+                  <a:rPr lang="en-US" altLang="ko-KR">
                     <a:latin typeface="나눔스퀘어_ac" panose="020B0600000101010101" pitchFamily="50" charset="-127"/>
                     <a:ea typeface="나눔스퀘어_ac" panose="020B0600000101010101" pitchFamily="50" charset="-127"/>
                   </a:rPr>
@@ -8149,7 +8081,7 @@
                   </a:lnSpc>
                 </a:pPr>
                 <a:r>
-                  <a:rPr lang="en-US" altLang="ko-KR" smtClean="0">
+                  <a:rPr lang="en-US" altLang="ko-KR">
                     <a:latin typeface="나눔스퀘어_ac" panose="020B0600000101010101" pitchFamily="50" charset="-127"/>
                     <a:ea typeface="나눔스퀘어_ac" panose="020B0600000101010101" pitchFamily="50" charset="-127"/>
                   </a:rPr>
@@ -8163,7 +8095,7 @@
                   </a:lnSpc>
                 </a:pPr>
                 <a:r>
-                  <a:rPr lang="en-US" altLang="ko-KR" smtClean="0">
+                  <a:rPr lang="en-US" altLang="ko-KR">
                     <a:latin typeface="나눔스퀘어_ac" panose="020B0600000101010101" pitchFamily="50" charset="-127"/>
                     <a:ea typeface="나눔스퀘어_ac" panose="020B0600000101010101" pitchFamily="50" charset="-127"/>
                   </a:rPr>
@@ -8260,7 +8192,7 @@
                   </a:lnSpc>
                 </a:pPr>
                 <a:r>
-                  <a:rPr lang="en-US" altLang="ko-KR" smtClean="0">
+                  <a:rPr lang="en-US" altLang="ko-KR">
                     <a:latin typeface="나눔스퀘어_ac" panose="020B0600000101010101" pitchFamily="50" charset="-127"/>
                     <a:ea typeface="나눔스퀘어_ac" panose="020B0600000101010101" pitchFamily="50" charset="-127"/>
                   </a:rPr>
@@ -8274,7 +8206,7 @@
                   </a:lnSpc>
                 </a:pPr>
                 <a:r>
-                  <a:rPr lang="en-US" altLang="ko-KR" smtClean="0">
+                  <a:rPr lang="en-US" altLang="ko-KR">
                     <a:latin typeface="나눔스퀘어_ac" panose="020B0600000101010101" pitchFamily="50" charset="-127"/>
                     <a:ea typeface="나눔스퀘어_ac" panose="020B0600000101010101" pitchFamily="50" charset="-127"/>
                   </a:rPr>
@@ -8387,7 +8319,7 @@
                   </a:lnSpc>
                 </a:pPr>
                 <a:r>
-                  <a:rPr lang="en-US" altLang="ko-KR" smtClean="0">
+                  <a:rPr lang="en-US" altLang="ko-KR">
                     <a:latin typeface="나눔스퀘어_ac" panose="020B0600000101010101" pitchFamily="50" charset="-127"/>
                     <a:ea typeface="나눔스퀘어_ac" panose="020B0600000101010101" pitchFamily="50" charset="-127"/>
                   </a:rPr>
@@ -8401,7 +8333,7 @@
                   </a:lnSpc>
                 </a:pPr>
                 <a:r>
-                  <a:rPr lang="en-US" altLang="ko-KR" smtClean="0">
+                  <a:rPr lang="en-US" altLang="ko-KR">
                     <a:latin typeface="나눔스퀘어_ac" panose="020B0600000101010101" pitchFamily="50" charset="-127"/>
                     <a:ea typeface="나눔스퀘어_ac" panose="020B0600000101010101" pitchFamily="50" charset="-127"/>
                   </a:rPr>
@@ -8662,7 +8594,7 @@
                   </a:lnSpc>
                 </a:pPr>
                 <a:r>
-                  <a:rPr lang="en-US" altLang="ko-KR" smtClean="0">
+                  <a:rPr lang="en-US" altLang="ko-KR">
                     <a:latin typeface="나눔스퀘어_ac" panose="020B0600000101010101" pitchFamily="50" charset="-127"/>
                     <a:ea typeface="나눔스퀘어_ac" panose="020B0600000101010101" pitchFamily="50" charset="-127"/>
                   </a:rPr>
@@ -8687,13 +8619,6 @@
   <p:clrMapOvr>
     <a:masterClrMapping/>
   </p:clrMapOvr>
-  <p:timing>
-    <p:tnLst>
-      <p:par>
-        <p:cTn id="1" dur="indefinite" restart="never" nodeType="tmRoot"/>
-      </p:par>
-    </p:tnLst>
-  </p:timing>
 </p:sld>
 </file>
 
@@ -8811,7 +8736,7 @@
               </a:lnSpc>
             </a:pPr>
             <a:r>
-              <a:rPr lang="en-US" altLang="ko-KR" sz="2667" smtClean="0">
+              <a:rPr lang="en-US" altLang="ko-KR" sz="2667">
                 <a:solidFill>
                   <a:srgbClr val="000000"/>
                 </a:solidFill>
@@ -8853,7 +8778,7 @@
           <a:lstStyle/>
           <a:p>
             <a:r>
-              <a:rPr lang="en-US" altLang="ko-KR" sz="2400" smtClean="0">
+              <a:rPr lang="en-US" altLang="ko-KR" sz="2400">
                 <a:latin typeface="나눔스퀘어_ac Bold" panose="020B0600000101010101" pitchFamily="50" charset="-127"/>
                 <a:ea typeface="나눔스퀘어_ac Bold" panose="020B0600000101010101" pitchFamily="50" charset="-127"/>
               </a:rPr>
@@ -8894,14 +8819,14 @@
               </a:lnSpc>
             </a:pPr>
             <a:r>
-              <a:rPr lang="en-US" altLang="ko-KR" smtClean="0">
+              <a:rPr lang="en-US" altLang="ko-KR">
                 <a:latin typeface="나눔스퀘어_ac" panose="020B0600000101010101" pitchFamily="50" charset="-127"/>
                 <a:ea typeface="나눔스퀘어_ac" panose="020B0600000101010101" pitchFamily="50" charset="-127"/>
               </a:rPr>
               <a:t>It measures </a:t>
             </a:r>
             <a:r>
-              <a:rPr lang="en-US" altLang="ko-KR" smtClean="0">
+              <a:rPr lang="en-US" altLang="ko-KR">
                 <a:latin typeface="나눔스퀘어_ac Bold" panose="020B0600000101010101" pitchFamily="50" charset="-127"/>
                 <a:ea typeface="나눔스퀘어_ac Bold" panose="020B0600000101010101" pitchFamily="50" charset="-127"/>
               </a:rPr>
@@ -8915,14 +8840,14 @@
               </a:lnSpc>
             </a:pPr>
             <a:r>
-              <a:rPr lang="en-US" altLang="ko-KR" smtClean="0">
+              <a:rPr lang="en-US" altLang="ko-KR">
                 <a:latin typeface="나눔스퀘어_ac Bold" panose="020B0600000101010101" pitchFamily="50" charset="-127"/>
                 <a:ea typeface="나눔스퀘어_ac Bold" panose="020B0600000101010101" pitchFamily="50" charset="-127"/>
               </a:rPr>
               <a:t>matches</a:t>
             </a:r>
             <a:r>
-              <a:rPr lang="en-US" altLang="ko-KR" smtClean="0">
+              <a:rPr lang="en-US" altLang="ko-KR">
                 <a:latin typeface="나눔스퀘어_ac" panose="020B0600000101010101" pitchFamily="50" charset="-127"/>
                 <a:ea typeface="나눔스퀘어_ac" panose="020B0600000101010101" pitchFamily="50" charset="-127"/>
               </a:rPr>
@@ -8962,23 +8887,19 @@
               </a:lnSpc>
             </a:pPr>
             <a:r>
-              <a:rPr lang="en-US" altLang="ko-KR" smtClean="0">
+              <a:rPr lang="en-US" altLang="ko-KR">
                 <a:latin typeface="나눔스퀘어_ac" panose="020B0600000101010101" pitchFamily="50" charset="-127"/>
                 <a:ea typeface="나눔스퀘어_ac" panose="020B0600000101010101" pitchFamily="50" charset="-127"/>
               </a:rPr>
               <a:t>It </a:t>
             </a:r>
             <a:r>
-              <a:rPr lang="ko-KR" altLang="en-US" smtClean="0">
+              <a:rPr lang="ko-KR" altLang="en-US">
                 <a:latin typeface="나눔스퀘어_ac" panose="020B0600000101010101" pitchFamily="50" charset="-127"/>
                 <a:ea typeface="나눔스퀘어_ac" panose="020B0600000101010101" pitchFamily="50" charset="-127"/>
               </a:rPr>
               <a:t>evaluates whether ground-truth related items within contexts are ranked high.</a:t>
             </a:r>
-            <a:endParaRPr lang="ko-KR" altLang="en-US">
-              <a:latin typeface="나눔스퀘어_ac" panose="020B0600000101010101" pitchFamily="50" charset="-127"/>
-              <a:ea typeface="나눔스퀘어_ac" panose="020B0600000101010101" pitchFamily="50" charset="-127"/>
-            </a:endParaRPr>
           </a:p>
         </p:txBody>
       </p:sp>
@@ -9010,7 +8931,7 @@
           <a:p>
             <a:pPr algn="ctr"/>
             <a:r>
-              <a:rPr lang="en-US" altLang="ko-KR" sz="2000" smtClean="0">
+              <a:rPr lang="en-US" altLang="ko-KR" sz="2000">
                 <a:solidFill>
                   <a:schemeClr val="bg1"/>
                 </a:solidFill>
@@ -9057,7 +8978,7 @@
           <a:p>
             <a:pPr algn="ctr"/>
             <a:r>
-              <a:rPr lang="en-US" altLang="ko-KR" sz="2000" smtClean="0">
+              <a:rPr lang="en-US" altLang="ko-KR" sz="2000">
                 <a:solidFill>
                   <a:schemeClr val="bg1"/>
                 </a:solidFill>
@@ -9117,37 +9038,33 @@
                 </a:lnSpc>
               </a:pPr>
               <a:r>
-                <a:rPr lang="en-US" altLang="ko-KR" smtClean="0">
+                <a:rPr lang="en-US" altLang="ko-KR">
                   <a:latin typeface="나눔스퀘어_ac" panose="020B0600000101010101" pitchFamily="50" charset="-127"/>
                   <a:ea typeface="나눔스퀘어_ac" panose="020B0600000101010101" pitchFamily="50" charset="-127"/>
                 </a:rPr>
                 <a:t>It measures </a:t>
               </a:r>
               <a:r>
-                <a:rPr lang="ko-KR" altLang="en-US" smtClean="0">
+                <a:rPr lang="ko-KR" altLang="en-US">
                   <a:latin typeface="나눔스퀘어_ac" panose="020B0600000101010101" pitchFamily="50" charset="-127"/>
                   <a:ea typeface="나눔스퀘어_ac" panose="020B0600000101010101" pitchFamily="50" charset="-127"/>
                 </a:rPr>
                 <a:t>how appropriate a generated answer is to a given prompt. It </a:t>
               </a:r>
               <a:r>
-                <a:rPr lang="ko-KR" altLang="en-US" smtClean="0">
+                <a:rPr lang="ko-KR" altLang="en-US">
                   <a:latin typeface="나눔스퀘어_ac Bold" panose="020B0600000101010101" pitchFamily="50" charset="-127"/>
                   <a:ea typeface="나눔스퀘어_ac Bold" panose="020B0600000101010101" pitchFamily="50" charset="-127"/>
                 </a:rPr>
                 <a:t>reflects the relevance of the generated response, the degree of redundancy</a:t>
               </a:r>
               <a:r>
-                <a:rPr lang="ko-KR" altLang="en-US" smtClean="0">
+                <a:rPr lang="ko-KR" altLang="en-US">
                   <a:latin typeface="나눔스퀘어_ac" panose="020B0600000101010101" pitchFamily="50" charset="-127"/>
                   <a:ea typeface="나눔스퀘어_ac" panose="020B0600000101010101" pitchFamily="50" charset="-127"/>
                 </a:rPr>
                 <a:t>, etc. in the assessment.</a:t>
               </a:r>
-              <a:endParaRPr lang="ko-KR" altLang="en-US">
-                <a:latin typeface="나눔스퀘어_ac" panose="020B0600000101010101" pitchFamily="50" charset="-127"/>
-                <a:ea typeface="나눔스퀘어_ac" panose="020B0600000101010101" pitchFamily="50" charset="-127"/>
-              </a:endParaRPr>
             </a:p>
           </p:txBody>
         </p:sp>
@@ -9178,37 +9095,33 @@
                 </a:lnSpc>
               </a:pPr>
               <a:r>
-                <a:rPr lang="en-US" altLang="ko-KR" smtClean="0">
+                <a:rPr lang="en-US" altLang="ko-KR">
                   <a:latin typeface="나눔스퀘어_ac" panose="020B0600000101010101" pitchFamily="50" charset="-127"/>
                   <a:ea typeface="나눔스퀘어_ac" panose="020B0600000101010101" pitchFamily="50" charset="-127"/>
                 </a:rPr>
                 <a:t>It </a:t>
               </a:r>
               <a:r>
-                <a:rPr lang="ko-KR" altLang="en-US" smtClean="0">
+                <a:rPr lang="ko-KR" altLang="en-US">
                   <a:latin typeface="나눔스퀘어_ac" panose="020B0600000101010101" pitchFamily="50" charset="-127"/>
                   <a:ea typeface="나눔스퀘어_ac" panose="020B0600000101010101" pitchFamily="50" charset="-127"/>
                 </a:rPr>
                 <a:t>measures the </a:t>
               </a:r>
               <a:r>
-                <a:rPr lang="ko-KR" altLang="en-US" smtClean="0">
+                <a:rPr lang="ko-KR" altLang="en-US">
                   <a:latin typeface="나눔스퀘어_ac Bold" panose="020B0600000101010101" pitchFamily="50" charset="-127"/>
                   <a:ea typeface="나눔스퀘어_ac Bold" panose="020B0600000101010101" pitchFamily="50" charset="-127"/>
                 </a:rPr>
                 <a:t>factual consistency </a:t>
               </a:r>
               <a:r>
-                <a:rPr lang="ko-KR" altLang="en-US" smtClean="0">
+                <a:rPr lang="ko-KR" altLang="en-US">
                   <a:latin typeface="나눔스퀘어_ac" panose="020B0600000101010101" pitchFamily="50" charset="-127"/>
                   <a:ea typeface="나눔스퀘어_ac" panose="020B0600000101010101" pitchFamily="50" charset="-127"/>
                 </a:rPr>
                 <a:t>of the generated answers against a given context.</a:t>
               </a:r>
-              <a:endParaRPr lang="ko-KR" altLang="en-US">
-                <a:latin typeface="나눔스퀘어_ac" panose="020B0600000101010101" pitchFamily="50" charset="-127"/>
-                <a:ea typeface="나눔스퀘어_ac" panose="020B0600000101010101" pitchFamily="50" charset="-127"/>
-              </a:endParaRPr>
             </a:p>
           </p:txBody>
         </p:sp>
@@ -9240,7 +9153,7 @@
             <a:p>
               <a:pPr algn="ctr"/>
               <a:r>
-                <a:rPr lang="en-US" altLang="ko-KR" sz="2000" smtClean="0">
+                <a:rPr lang="en-US" altLang="ko-KR" sz="2000">
                   <a:solidFill>
                     <a:schemeClr val="bg1"/>
                   </a:solidFill>
@@ -9287,7 +9200,7 @@
             <a:p>
               <a:pPr algn="ctr"/>
               <a:r>
-                <a:rPr lang="en-US" altLang="ko-KR" sz="2000" smtClean="0">
+                <a:rPr lang="en-US" altLang="ko-KR" sz="2000">
                   <a:solidFill>
                     <a:schemeClr val="bg1"/>
                   </a:solidFill>
@@ -9331,7 +9244,7 @@
           <a:p>
             <a:pPr algn="r"/>
             <a:r>
-              <a:rPr lang="en-US" altLang="ko-KR" sz="2400" i="1" smtClean="0">
+              <a:rPr lang="en-US" altLang="ko-KR" sz="2400" i="1">
                 <a:solidFill>
                   <a:srgbClr val="BFBFBF"/>
                 </a:solidFill>
@@ -9356,13 +9269,6 @@
   <p:clrMapOvr>
     <a:masterClrMapping/>
   </p:clrMapOvr>
-  <p:timing>
-    <p:tnLst>
-      <p:par>
-        <p:cTn id="1" dur="indefinite" restart="never" nodeType="tmRoot"/>
-      </p:par>
-    </p:tnLst>
-  </p:timing>
 </p:sld>
 </file>
 
@@ -9527,70 +9433,70 @@
                 <a:gridCol w="1817771">
                   <a:extLst>
                     <a:ext uri="{9D8B030D-6E8A-4147-A177-3AD203B41FA5}">
-                      <a16:colId xmlns="" xmlns:a16="http://schemas.microsoft.com/office/drawing/2014/main" val="20000"/>
+                      <a16:colId xmlns:a16="http://schemas.microsoft.com/office/drawing/2014/main" val="20000"/>
                     </a:ext>
                   </a:extLst>
                 </a:gridCol>
                 <a:gridCol w="804241">
                   <a:extLst>
                     <a:ext uri="{9D8B030D-6E8A-4147-A177-3AD203B41FA5}">
-                      <a16:colId xmlns="" xmlns:a16="http://schemas.microsoft.com/office/drawing/2014/main" val="20001"/>
+                      <a16:colId xmlns:a16="http://schemas.microsoft.com/office/drawing/2014/main" val="20001"/>
                     </a:ext>
                   </a:extLst>
                 </a:gridCol>
                 <a:gridCol w="804241">
                   <a:extLst>
                     <a:ext uri="{9D8B030D-6E8A-4147-A177-3AD203B41FA5}">
-                      <a16:colId xmlns="" xmlns:a16="http://schemas.microsoft.com/office/drawing/2014/main" val="20002"/>
+                      <a16:colId xmlns:a16="http://schemas.microsoft.com/office/drawing/2014/main" val="20002"/>
                     </a:ext>
                   </a:extLst>
                 </a:gridCol>
                 <a:gridCol w="804241">
                   <a:extLst>
                     <a:ext uri="{9D8B030D-6E8A-4147-A177-3AD203B41FA5}">
-                      <a16:colId xmlns="" xmlns:a16="http://schemas.microsoft.com/office/drawing/2014/main" val="20003"/>
+                      <a16:colId xmlns:a16="http://schemas.microsoft.com/office/drawing/2014/main" val="20003"/>
                     </a:ext>
                   </a:extLst>
                 </a:gridCol>
                 <a:gridCol w="804241">
                   <a:extLst>
                     <a:ext uri="{9D8B030D-6E8A-4147-A177-3AD203B41FA5}">
-                      <a16:colId xmlns="" xmlns:a16="http://schemas.microsoft.com/office/drawing/2014/main" val="20004"/>
+                      <a16:colId xmlns:a16="http://schemas.microsoft.com/office/drawing/2014/main" val="20004"/>
                     </a:ext>
                   </a:extLst>
                 </a:gridCol>
                 <a:gridCol w="804241">
                   <a:extLst>
                     <a:ext uri="{9D8B030D-6E8A-4147-A177-3AD203B41FA5}">
-                      <a16:colId xmlns="" xmlns:a16="http://schemas.microsoft.com/office/drawing/2014/main" val="20005"/>
+                      <a16:colId xmlns:a16="http://schemas.microsoft.com/office/drawing/2014/main" val="20005"/>
                     </a:ext>
                   </a:extLst>
                 </a:gridCol>
                 <a:gridCol w="804241">
                   <a:extLst>
                     <a:ext uri="{9D8B030D-6E8A-4147-A177-3AD203B41FA5}">
-                      <a16:colId xmlns="" xmlns:a16="http://schemas.microsoft.com/office/drawing/2014/main" val="20006"/>
+                      <a16:colId xmlns:a16="http://schemas.microsoft.com/office/drawing/2014/main" val="20006"/>
                     </a:ext>
                   </a:extLst>
                 </a:gridCol>
                 <a:gridCol w="804241">
                   <a:extLst>
                     <a:ext uri="{9D8B030D-6E8A-4147-A177-3AD203B41FA5}">
-                      <a16:colId xmlns="" xmlns:a16="http://schemas.microsoft.com/office/drawing/2014/main" val="20007"/>
+                      <a16:colId xmlns:a16="http://schemas.microsoft.com/office/drawing/2014/main" val="20007"/>
                     </a:ext>
                   </a:extLst>
                 </a:gridCol>
                 <a:gridCol w="804241">
                   <a:extLst>
                     <a:ext uri="{9D8B030D-6E8A-4147-A177-3AD203B41FA5}">
-                      <a16:colId xmlns="" xmlns:a16="http://schemas.microsoft.com/office/drawing/2014/main" val="20008"/>
+                      <a16:colId xmlns:a16="http://schemas.microsoft.com/office/drawing/2014/main" val="20008"/>
                     </a:ext>
                   </a:extLst>
                 </a:gridCol>
                 <a:gridCol w="804241">
                   <a:extLst>
                     <a:ext uri="{9D8B030D-6E8A-4147-A177-3AD203B41FA5}">
-                      <a16:colId xmlns="" xmlns:a16="http://schemas.microsoft.com/office/drawing/2014/main" val="20009"/>
+                      <a16:colId xmlns:a16="http://schemas.microsoft.com/office/drawing/2014/main" val="20009"/>
                     </a:ext>
                   </a:extLst>
                 </a:gridCol>
@@ -10404,7 +10310,7 @@
                 </a:tc>
                 <a:extLst>
                   <a:ext uri="{0D108BD9-81ED-4DB2-BD59-A6C34878D82A}">
-                    <a16:rowId xmlns="" xmlns:a16="http://schemas.microsoft.com/office/drawing/2014/main" val="10000"/>
+                    <a16:rowId xmlns:a16="http://schemas.microsoft.com/office/drawing/2014/main" val="10000"/>
                   </a:ext>
                 </a:extLst>
               </a:tr>
@@ -10983,7 +10889,7 @@
                 </a:tc>
                 <a:extLst>
                   <a:ext uri="{0D108BD9-81ED-4DB2-BD59-A6C34878D82A}">
-                    <a16:rowId xmlns="" xmlns:a16="http://schemas.microsoft.com/office/drawing/2014/main" val="10001"/>
+                    <a16:rowId xmlns:a16="http://schemas.microsoft.com/office/drawing/2014/main" val="10001"/>
                   </a:ext>
                 </a:extLst>
               </a:tr>
@@ -11560,7 +11466,7 @@
                 </a:tc>
                 <a:extLst>
                   <a:ext uri="{0D108BD9-81ED-4DB2-BD59-A6C34878D82A}">
-                    <a16:rowId xmlns="" xmlns:a16="http://schemas.microsoft.com/office/drawing/2014/main" val="10002"/>
+                    <a16:rowId xmlns:a16="http://schemas.microsoft.com/office/drawing/2014/main" val="10002"/>
                   </a:ext>
                 </a:extLst>
               </a:tr>
@@ -12163,7 +12069,7 @@
                 </a:tc>
                 <a:extLst>
                   <a:ext uri="{0D108BD9-81ED-4DB2-BD59-A6C34878D82A}">
-                    <a16:rowId xmlns="" xmlns:a16="http://schemas.microsoft.com/office/drawing/2014/main" val="10003"/>
+                    <a16:rowId xmlns:a16="http://schemas.microsoft.com/office/drawing/2014/main" val="10003"/>
                   </a:ext>
                 </a:extLst>
               </a:tr>
@@ -12748,7 +12654,7 @@
                 </a:tc>
                 <a:extLst>
                   <a:ext uri="{0D108BD9-81ED-4DB2-BD59-A6C34878D82A}">
-                    <a16:rowId xmlns="" xmlns:a16="http://schemas.microsoft.com/office/drawing/2014/main" val="10004"/>
+                    <a16:rowId xmlns:a16="http://schemas.microsoft.com/office/drawing/2014/main" val="10004"/>
                   </a:ext>
                 </a:extLst>
               </a:tr>
@@ -13333,7 +13239,7 @@
                 </a:tc>
                 <a:extLst>
                   <a:ext uri="{0D108BD9-81ED-4DB2-BD59-A6C34878D82A}">
-                    <a16:rowId xmlns="" xmlns:a16="http://schemas.microsoft.com/office/drawing/2014/main" val="10005"/>
+                    <a16:rowId xmlns:a16="http://schemas.microsoft.com/office/drawing/2014/main" val="10005"/>
                   </a:ext>
                 </a:extLst>
               </a:tr>
@@ -13914,7 +13820,7 @@
                 </a:tc>
                 <a:extLst>
                   <a:ext uri="{0D108BD9-81ED-4DB2-BD59-A6C34878D82A}">
-                    <a16:rowId xmlns="" xmlns:a16="http://schemas.microsoft.com/office/drawing/2014/main" val="10006"/>
+                    <a16:rowId xmlns:a16="http://schemas.microsoft.com/office/drawing/2014/main" val="10006"/>
                   </a:ext>
                 </a:extLst>
               </a:tr>
@@ -14507,7 +14413,7 @@
                 </a:tc>
                 <a:extLst>
                   <a:ext uri="{0D108BD9-81ED-4DB2-BD59-A6C34878D82A}">
-                    <a16:rowId xmlns="" xmlns:a16="http://schemas.microsoft.com/office/drawing/2014/main" val="10007"/>
+                    <a16:rowId xmlns:a16="http://schemas.microsoft.com/office/drawing/2014/main" val="10007"/>
                   </a:ext>
                 </a:extLst>
               </a:tr>
@@ -15108,7 +15014,7 @@
                 </a:tc>
                 <a:extLst>
                   <a:ext uri="{0D108BD9-81ED-4DB2-BD59-A6C34878D82A}">
-                    <a16:rowId xmlns="" xmlns:a16="http://schemas.microsoft.com/office/drawing/2014/main" val="10008"/>
+                    <a16:rowId xmlns:a16="http://schemas.microsoft.com/office/drawing/2014/main" val="10008"/>
                   </a:ext>
                 </a:extLst>
               </a:tr>
@@ -15683,7 +15589,7 @@
                 </a:tc>
                 <a:extLst>
                   <a:ext uri="{0D108BD9-81ED-4DB2-BD59-A6C34878D82A}">
-                    <a16:rowId xmlns="" xmlns:a16="http://schemas.microsoft.com/office/drawing/2014/main" val="10009"/>
+                    <a16:rowId xmlns:a16="http://schemas.microsoft.com/office/drawing/2014/main" val="10009"/>
                   </a:ext>
                 </a:extLst>
               </a:tr>
@@ -16258,7 +16164,7 @@
                 </a:tc>
                 <a:extLst>
                   <a:ext uri="{0D108BD9-81ED-4DB2-BD59-A6C34878D82A}">
-                    <a16:rowId xmlns="" xmlns:a16="http://schemas.microsoft.com/office/drawing/2014/main" val="10010"/>
+                    <a16:rowId xmlns:a16="http://schemas.microsoft.com/office/drawing/2014/main" val="10010"/>
                   </a:ext>
                 </a:extLst>
               </a:tr>
@@ -16293,7 +16199,7 @@
               </a:lnSpc>
             </a:pPr>
             <a:r>
-              <a:rPr lang="en-US" altLang="ko-KR" sz="1867" smtClean="0">
+              <a:rPr lang="en-US" altLang="ko-KR" sz="1867">
                 <a:latin typeface="나눔스퀘어_ac" panose="020B0600000101010101" pitchFamily="50" charset="-127"/>
                 <a:ea typeface="나눔스퀘어_ac" panose="020B0600000101010101" pitchFamily="50" charset="-127"/>
               </a:rPr>
@@ -16307,35 +16213,35 @@
               </a:lnSpc>
             </a:pPr>
             <a:r>
-              <a:rPr lang="en-US" altLang="ko-KR" sz="1867" smtClean="0">
+              <a:rPr lang="en-US" altLang="ko-KR" sz="1867">
                 <a:latin typeface="나눔스퀘어_ac" panose="020B0600000101010101" pitchFamily="50" charset="-127"/>
                 <a:ea typeface="나눔스퀘어_ac" panose="020B0600000101010101" pitchFamily="50" charset="-127"/>
               </a:rPr>
               <a:t>we considered </a:t>
             </a:r>
             <a:r>
-              <a:rPr lang="en-US" altLang="ko-KR" sz="1867" smtClean="0">
+              <a:rPr lang="en-US" altLang="ko-KR" sz="1867">
                 <a:latin typeface="나눔스퀘어_ac Bold" panose="020B0600000101010101" pitchFamily="50" charset="-127"/>
                 <a:ea typeface="나눔스퀘어_ac Bold" panose="020B0600000101010101" pitchFamily="50" charset="-127"/>
               </a:rPr>
               <a:t>additional features</a:t>
             </a:r>
             <a:r>
-              <a:rPr lang="en-US" altLang="ko-KR" sz="1867" smtClean="0">
+              <a:rPr lang="en-US" altLang="ko-KR" sz="1867">
                 <a:latin typeface="나눔스퀘어_ac" panose="020B0600000101010101" pitchFamily="50" charset="-127"/>
                 <a:ea typeface="나눔스퀘어_ac" panose="020B0600000101010101" pitchFamily="50" charset="-127"/>
               </a:rPr>
               <a:t> and tried to </a:t>
             </a:r>
             <a:r>
-              <a:rPr lang="en-US" altLang="ko-KR" sz="1867" smtClean="0">
+              <a:rPr lang="en-US" altLang="ko-KR" sz="1867">
                 <a:latin typeface="나눔스퀘어_ac Bold" panose="020B0600000101010101" pitchFamily="50" charset="-127"/>
                 <a:ea typeface="나눔스퀘어_ac Bold" panose="020B0600000101010101" pitchFamily="50" charset="-127"/>
               </a:rPr>
               <a:t>improve the model</a:t>
             </a:r>
             <a:r>
-              <a:rPr lang="en-US" altLang="ko-KR" sz="1867" smtClean="0">
+              <a:rPr lang="en-US" altLang="ko-KR" sz="1867">
                 <a:latin typeface="나눔스퀘어_ac" panose="020B0600000101010101" pitchFamily="50" charset="-127"/>
                 <a:ea typeface="나눔스퀘어_ac" panose="020B0600000101010101" pitchFamily="50" charset="-127"/>
               </a:rPr>
@@ -17455,7 +17361,7 @@
               </a:lnSpc>
             </a:pPr>
             <a:r>
-              <a:rPr lang="en-US" altLang="ko-KR" sz="2667" smtClean="0">
+              <a:rPr lang="en-US" altLang="ko-KR" sz="2667">
                 <a:solidFill>
                   <a:srgbClr val="000000"/>
                 </a:solidFill>
@@ -17497,7 +17403,7 @@
           <a:lstStyle/>
           <a:p>
             <a:r>
-              <a:rPr lang="en-US" altLang="ko-KR" sz="2400" smtClean="0">
+              <a:rPr lang="en-US" altLang="ko-KR" sz="2400">
                 <a:latin typeface="나눔스퀘어_ac Bold" panose="020B0600000101010101" pitchFamily="50" charset="-127"/>
                 <a:ea typeface="나눔스퀘어_ac Bold" panose="020B0600000101010101" pitchFamily="50" charset="-127"/>
               </a:rPr>
@@ -17515,7 +17421,7 @@
           <p:cNvPr id="10" name="그림 9">
             <a:extLst>
               <a:ext uri="{FF2B5EF4-FFF2-40B4-BE49-F238E27FC236}">
-                <a16:creationId xmlns="" xmlns:a16="http://schemas.microsoft.com/office/drawing/2014/main" id="{122F81A3-2F45-FABB-8181-BAB00843FE0C}"/>
+                <a16:creationId xmlns:a16="http://schemas.microsoft.com/office/drawing/2014/main" id="{122F81A3-2F45-FABB-8181-BAB00843FE0C}"/>
               </a:ext>
             </a:extLst>
           </p:cNvPr>
@@ -17658,7 +17564,7 @@
           <a:p>
             <a:pPr algn="ctr"/>
             <a:r>
-              <a:rPr lang="en-US" altLang="ko-KR" sz="2000" smtClean="0">
+              <a:rPr lang="en-US" altLang="ko-KR" sz="2000">
                 <a:latin typeface="나눔스퀘어_ac" panose="020B0600000101010101" pitchFamily="50" charset="-127"/>
                 <a:ea typeface="나눔스퀘어_ac" panose="020B0600000101010101" pitchFamily="50" charset="-127"/>
               </a:rPr>
@@ -17798,7 +17704,7 @@
               </a:lnSpc>
             </a:pPr>
             <a:r>
-              <a:rPr lang="en-US" altLang="ko-KR" sz="2667" smtClean="0">
+              <a:rPr lang="en-US" altLang="ko-KR" sz="2667">
                 <a:solidFill>
                   <a:srgbClr val="000000"/>
                 </a:solidFill>
@@ -17822,7 +17728,7 @@
           <p:cNvPr id="38" name="그림 37">
             <a:extLst>
               <a:ext uri="{FF2B5EF4-FFF2-40B4-BE49-F238E27FC236}">
-                <a16:creationId xmlns="" xmlns:a16="http://schemas.microsoft.com/office/drawing/2014/main" id="{EFCF38EA-C063-95C5-4FDC-09A2C0E25142}"/>
+                <a16:creationId xmlns:a16="http://schemas.microsoft.com/office/drawing/2014/main" id="{EFCF38EA-C063-95C5-4FDC-09A2C0E25142}"/>
               </a:ext>
             </a:extLst>
           </p:cNvPr>
@@ -17892,7 +17798,7 @@
             <a:p>
               <a:pPr algn="ctr"/>
               <a:r>
-                <a:rPr lang="en-US" altLang="ko-KR" sz="2000" smtClean="0">
+                <a:rPr lang="en-US" altLang="ko-KR" sz="2000">
                   <a:latin typeface="나눔스퀘어_ac" panose="020B0600000101010101" pitchFamily="50" charset="-127"/>
                   <a:ea typeface="나눔스퀘어_ac" panose="020B0600000101010101" pitchFamily="50" charset="-127"/>
                 </a:rPr>
@@ -17973,14 +17879,14 @@
                 </a:lnSpc>
               </a:pPr>
               <a:r>
-                <a:rPr lang="ko-KR" altLang="en-US" smtClean="0">
+                <a:rPr lang="ko-KR" altLang="en-US">
                   <a:latin typeface="나눔스퀘어_ac" panose="020B0600000101010101" pitchFamily="50" charset="-127"/>
                   <a:ea typeface="나눔스퀘어_ac" panose="020B0600000101010101" pitchFamily="50" charset="-127"/>
                 </a:rPr>
                 <a:t>After that, we plan to implement the login function by linking this screen with </a:t>
               </a:r>
               <a:r>
-                <a:rPr lang="en-US" altLang="ko-KR" smtClean="0">
+                <a:rPr lang="en-US" altLang="ko-KR">
                   <a:latin typeface="나눔스퀘어_ac" panose="020B0600000101010101" pitchFamily="50" charset="-127"/>
                   <a:ea typeface="나눔스퀘어_ac" panose="020B0600000101010101" pitchFamily="50" charset="-127"/>
                 </a:rPr>
@@ -18017,7 +17923,7 @@
           <a:lstStyle/>
           <a:p>
             <a:r>
-              <a:rPr lang="en-US" altLang="ko-KR" sz="2400" smtClean="0">
+              <a:rPr lang="en-US" altLang="ko-KR" sz="2400">
                 <a:latin typeface="나눔스퀘어_ac Bold" panose="020B0600000101010101" pitchFamily="50" charset="-127"/>
                 <a:ea typeface="나눔스퀘어_ac Bold" panose="020B0600000101010101" pitchFamily="50" charset="-127"/>
               </a:rPr>
@@ -18157,7 +18063,7 @@
               </a:lnSpc>
             </a:pPr>
             <a:r>
-              <a:rPr lang="en-US" altLang="ko-KR" sz="2667" smtClean="0">
+              <a:rPr lang="en-US" altLang="ko-KR" sz="2667">
                 <a:solidFill>
                   <a:srgbClr val="000000"/>
                 </a:solidFill>
@@ -18181,7 +18087,7 @@
           <p:cNvPr id="11" name="그림 10">
             <a:extLst>
               <a:ext uri="{FF2B5EF4-FFF2-40B4-BE49-F238E27FC236}">
-                <a16:creationId xmlns="" xmlns:a16="http://schemas.microsoft.com/office/drawing/2014/main" id="{5C23D65F-69F4-58C5-6975-A833A4A67568}"/>
+                <a16:creationId xmlns:a16="http://schemas.microsoft.com/office/drawing/2014/main" id="{5C23D65F-69F4-58C5-6975-A833A4A67568}"/>
               </a:ext>
             </a:extLst>
           </p:cNvPr>
@@ -18332,7 +18238,7 @@
           <p:cNvPr id="14" name="TextBox 13">
             <a:extLst>
               <a:ext uri="{FF2B5EF4-FFF2-40B4-BE49-F238E27FC236}">
-                <a16:creationId xmlns="" xmlns:a16="http://schemas.microsoft.com/office/drawing/2014/main" id="{3267E0C0-BF0E-AC31-0982-3EBB49EFD4D1}"/>
+                <a16:creationId xmlns:a16="http://schemas.microsoft.com/office/drawing/2014/main" id="{3267E0C0-BF0E-AC31-0982-3EBB49EFD4D1}"/>
               </a:ext>
             </a:extLst>
           </p:cNvPr>
@@ -18365,7 +18271,7 @@
               </a:lnSpc>
             </a:pPr>
             <a:r>
-              <a:rPr lang="en-US" altLang="ko-KR" sz="1600" smtClean="0">
+              <a:rPr lang="en-US" altLang="ko-KR" sz="1600">
                 <a:solidFill>
                   <a:schemeClr val="bg1"/>
                 </a:solidFill>
@@ -18523,7 +18429,7 @@
                 </a:lnSpc>
               </a:pPr>
               <a:r>
-                <a:rPr lang="en-US" altLang="ko-KR" sz="2000" smtClean="0">
+                <a:rPr lang="en-US" altLang="ko-KR" sz="2000">
                   <a:latin typeface="나눔스퀘어_ac" panose="020B0600000101010101" pitchFamily="50" charset="-127"/>
                   <a:ea typeface="나눔스퀘어_ac" panose="020B0600000101010101" pitchFamily="50" charset="-127"/>
                 </a:rPr>
@@ -18537,7 +18443,7 @@
                 </a:lnSpc>
               </a:pPr>
               <a:r>
-                <a:rPr lang="en-US" altLang="ko-KR" sz="2000" smtClean="0">
+                <a:rPr lang="en-US" altLang="ko-KR" sz="2000">
                   <a:latin typeface="나눔스퀘어_ac" panose="020B0600000101010101" pitchFamily="50" charset="-127"/>
                   <a:ea typeface="나눔스퀘어_ac" panose="020B0600000101010101" pitchFamily="50" charset="-127"/>
                 </a:rPr>
@@ -18619,7 +18525,7 @@
                 </a:lnSpc>
               </a:pPr>
               <a:r>
-                <a:rPr lang="en-US" altLang="ko-KR" sz="2000" smtClean="0">
+                <a:rPr lang="en-US" altLang="ko-KR" sz="2000">
                   <a:latin typeface="나눔스퀘어_ac" panose="020B0600000101010101" pitchFamily="50" charset="-127"/>
                   <a:ea typeface="나눔스퀘어_ac" panose="020B0600000101010101" pitchFamily="50" charset="-127"/>
                 </a:rPr>
@@ -18633,7 +18539,7 @@
                 </a:lnSpc>
               </a:pPr>
               <a:r>
-                <a:rPr lang="en-US" altLang="ko-KR" sz="2000" smtClean="0">
+                <a:rPr lang="en-US" altLang="ko-KR" sz="2000">
                   <a:latin typeface="나눔스퀘어_ac" panose="020B0600000101010101" pitchFamily="50" charset="-127"/>
                   <a:ea typeface="나눔스퀘어_ac" panose="020B0600000101010101" pitchFamily="50" charset="-127"/>
                 </a:rPr>
@@ -18670,7 +18576,7 @@
           <a:lstStyle/>
           <a:p>
             <a:r>
-              <a:rPr lang="en-US" altLang="ko-KR" sz="2400" smtClean="0">
+              <a:rPr lang="en-US" altLang="ko-KR" sz="2400">
                 <a:latin typeface="나눔스퀘어_ac Bold" panose="020B0600000101010101" pitchFamily="50" charset="-127"/>
                 <a:ea typeface="나눔스퀘어_ac Bold" panose="020B0600000101010101" pitchFamily="50" charset="-127"/>
               </a:rPr>
@@ -18810,7 +18716,7 @@
               </a:lnSpc>
             </a:pPr>
             <a:r>
-              <a:rPr lang="en-US" altLang="ko-KR" sz="2667" smtClean="0">
+              <a:rPr lang="en-US" altLang="ko-KR" sz="2667">
                 <a:solidFill>
                   <a:srgbClr val="000000"/>
                 </a:solidFill>
@@ -18852,7 +18758,7 @@
           <a:lstStyle/>
           <a:p>
             <a:r>
-              <a:rPr lang="en-US" altLang="ko-KR" sz="2400" smtClean="0">
+              <a:rPr lang="en-US" altLang="ko-KR" sz="2400">
                 <a:latin typeface="나눔스퀘어_ac Bold" panose="020B0600000101010101" pitchFamily="50" charset="-127"/>
                 <a:ea typeface="나눔스퀘어_ac Bold" panose="020B0600000101010101" pitchFamily="50" charset="-127"/>
               </a:rPr>
@@ -18870,7 +18776,7 @@
           <p:cNvPr id="10" name="그림 9">
             <a:extLst>
               <a:ext uri="{FF2B5EF4-FFF2-40B4-BE49-F238E27FC236}">
-                <a16:creationId xmlns="" xmlns:a16="http://schemas.microsoft.com/office/drawing/2014/main" id="{9EA2F215-D67C-9FD2-F88A-9006F70BAFE2}"/>
+                <a16:creationId xmlns:a16="http://schemas.microsoft.com/office/drawing/2014/main" id="{9EA2F215-D67C-9FD2-F88A-9006F70BAFE2}"/>
               </a:ext>
             </a:extLst>
           </p:cNvPr>
@@ -18919,7 +18825,7 @@
           <a:p>
             <a:pPr algn="ctr"/>
             <a:r>
-              <a:rPr lang="en-US" altLang="ko-KR" sz="2000" smtClean="0">
+              <a:rPr lang="en-US" altLang="ko-KR" sz="2000">
                 <a:latin typeface="나눔스퀘어_ac" panose="020B0600000101010101" pitchFamily="50" charset="-127"/>
                 <a:ea typeface="나눔스퀘어_ac" panose="020B0600000101010101" pitchFamily="50" charset="-127"/>
               </a:rPr>
@@ -18995,13 +18901,6 @@
   <p:clrMapOvr>
     <a:masterClrMapping/>
   </p:clrMapOvr>
-  <p:timing>
-    <p:tnLst>
-      <p:par>
-        <p:cTn id="1" dur="indefinite" restart="never" nodeType="tmRoot"/>
-      </p:par>
-    </p:tnLst>
-  </p:timing>
 </p:sld>
 </file>
 
@@ -19119,7 +19018,7 @@
               </a:lnSpc>
             </a:pPr>
             <a:r>
-              <a:rPr lang="en-US" altLang="ko-KR" sz="2667" smtClean="0">
+              <a:rPr lang="en-US" altLang="ko-KR" sz="2667">
                 <a:solidFill>
                   <a:srgbClr val="000000"/>
                 </a:solidFill>
@@ -19161,7 +19060,7 @@
           <a:lstStyle/>
           <a:p>
             <a:r>
-              <a:rPr lang="en-US" altLang="ko-KR" sz="2400" smtClean="0">
+              <a:rPr lang="en-US" altLang="ko-KR" sz="2400">
                 <a:latin typeface="나눔스퀘어_ac Bold" panose="020B0600000101010101" pitchFamily="50" charset="-127"/>
                 <a:ea typeface="나눔스퀘어_ac Bold" panose="020B0600000101010101" pitchFamily="50" charset="-127"/>
               </a:rPr>
@@ -19264,7 +19163,7 @@
                 </a:lnSpc>
               </a:pPr>
               <a:r>
-                <a:rPr lang="en-US" altLang="ko-KR" sz="2000" smtClean="0">
+                <a:rPr lang="en-US" altLang="ko-KR" sz="2000">
                   <a:latin typeface="나눔스퀘어_ac" panose="020B0600000101010101" pitchFamily="50" charset="-127"/>
                   <a:ea typeface="나눔스퀘어_ac" panose="020B0600000101010101" pitchFamily="50" charset="-127"/>
                 </a:rPr>
@@ -19278,14 +19177,14 @@
                 </a:lnSpc>
               </a:pPr>
               <a:r>
-                <a:rPr lang="ko-KR" altLang="en-US" sz="2000" smtClean="0">
+                <a:rPr lang="ko-KR" altLang="en-US" sz="2000">
                   <a:latin typeface="나눔스퀘어_ac" panose="020B0600000101010101" pitchFamily="50" charset="-127"/>
                   <a:ea typeface="나눔스퀘어_ac" panose="020B0600000101010101" pitchFamily="50" charset="-127"/>
                 </a:rPr>
                 <a:t>→ </a:t>
               </a:r>
               <a:r>
-                <a:rPr lang="en-US" altLang="ko-KR" sz="2000" smtClean="0">
+                <a:rPr lang="en-US" altLang="ko-KR" sz="2000">
                   <a:latin typeface="나눔스퀘어_ac" panose="020B0600000101010101" pitchFamily="50" charset="-127"/>
                   <a:ea typeface="나눔스퀘어_ac" panose="020B0600000101010101" pitchFamily="50" charset="-127"/>
                 </a:rPr>
@@ -19379,14 +19278,7 @@
                 <a:latin typeface="나눔스퀘어_ac" panose="020B0600000101010101" pitchFamily="50" charset="-127"/>
                 <a:ea typeface="나눔스퀘어_ac" panose="020B0600000101010101" pitchFamily="50" charset="-127"/>
               </a:rPr>
-              <a:t>3</a:t>
-            </a:r>
-            <a:r>
-              <a:rPr lang="en-US" altLang="ko-KR" sz="2000" smtClean="0">
-                <a:latin typeface="나눔스퀘어_ac" panose="020B0600000101010101" pitchFamily="50" charset="-127"/>
-                <a:ea typeface="나눔스퀘어_ac" panose="020B0600000101010101" pitchFamily="50" charset="-127"/>
-              </a:rPr>
-              <a:t>. When a new chatroom is created, it opens immediately.</a:t>
+              <a:t>3. When a new chatroom is created, it opens immediately.</a:t>
             </a:r>
           </a:p>
         </p:txBody>
@@ -19467,7 +19359,7 @@
               </a:lnSpc>
             </a:pPr>
             <a:r>
-              <a:rPr lang="en-US" altLang="ko-KR" sz="2000" smtClean="0">
+              <a:rPr lang="en-US" altLang="ko-KR" sz="2000">
                 <a:latin typeface="나눔스퀘어_ac" panose="020B0600000101010101" pitchFamily="50" charset="-127"/>
                 <a:ea typeface="나눔스퀘어_ac" panose="020B0600000101010101" pitchFamily="50" charset="-127"/>
               </a:rPr>
@@ -19481,7 +19373,7 @@
           <p:cNvPr id="20" name="그림 19">
             <a:extLst>
               <a:ext uri="{FF2B5EF4-FFF2-40B4-BE49-F238E27FC236}">
-                <a16:creationId xmlns="" xmlns:a16="http://schemas.microsoft.com/office/drawing/2014/main" id="{04274239-2E7E-C243-99B9-733C78A7A20B}"/>
+                <a16:creationId xmlns:a16="http://schemas.microsoft.com/office/drawing/2014/main" id="{04274239-2E7E-C243-99B9-733C78A7A20B}"/>
               </a:ext>
             </a:extLst>
           </p:cNvPr>
@@ -19564,13 +19456,6 @@
   <p:clrMapOvr>
     <a:masterClrMapping/>
   </p:clrMapOvr>
-  <p:timing>
-    <p:tnLst>
-      <p:par>
-        <p:cTn id="1" dur="indefinite" restart="never" nodeType="tmRoot"/>
-      </p:par>
-    </p:tnLst>
-  </p:timing>
 </p:sld>
 </file>
 
@@ -19688,7 +19573,7 @@
               </a:lnSpc>
             </a:pPr>
             <a:r>
-              <a:rPr lang="en-US" altLang="ko-KR" sz="2667" smtClean="0">
+              <a:rPr lang="en-US" altLang="ko-KR" sz="2667">
                 <a:solidFill>
                   <a:srgbClr val="000000"/>
                 </a:solidFill>
@@ -19730,7 +19615,7 @@
           <a:lstStyle/>
           <a:p>
             <a:r>
-              <a:rPr lang="en-US" altLang="ko-KR" sz="2400" smtClean="0">
+              <a:rPr lang="en-US" altLang="ko-KR" sz="2400">
                 <a:latin typeface="나눔스퀘어_ac Bold" panose="020B0600000101010101" pitchFamily="50" charset="-127"/>
                 <a:ea typeface="나눔스퀘어_ac Bold" panose="020B0600000101010101" pitchFamily="50" charset="-127"/>
               </a:rPr>
@@ -19836,13 +19721,6 @@
   <p:clrMapOvr>
     <a:masterClrMapping/>
   </p:clrMapOvr>
-  <p:timing>
-    <p:tnLst>
-      <p:par>
-        <p:cTn id="1" dur="indefinite" restart="never" nodeType="tmRoot"/>
-      </p:par>
-    </p:tnLst>
-  </p:timing>
 </p:sld>
 </file>
 

</xml_diff>